<commit_message>
Fixed a lot of GUI bugs. Going to PInvoke was an awesome idea! I can finally debug managed code.
</commit_message>
<xml_diff>
--- a/Docs/Gui.pptx
+++ b/Docs/Gui.pptx
@@ -6,6 +6,7 @@
   </p:sldMasterIdLst>
   <p:sldIdLst>
     <p:sldId id="256" r:id="rId2"/>
+    <p:sldId id="257" r:id="rId3"/>
   </p:sldIdLst>
   <p:sldSz cx="12192000" cy="6858000"/>
   <p:notesSz cx="6858000" cy="9144000"/>
@@ -243,7 +244,7 @@
           <a:p>
             <a:fld id="{47491EC4-C74A-4DCB-BF28-C0A7248C12D2}" type="datetimeFigureOut">
               <a:rPr lang="en-US" smtClean="0"/>
-              <a:t>12/13/2013</a:t>
+              <a:t>12/18/2013</a:t>
             </a:fld>
             <a:endParaRPr lang="en-US"/>
           </a:p>
@@ -413,7 +414,7 @@
           <a:p>
             <a:fld id="{47491EC4-C74A-4DCB-BF28-C0A7248C12D2}" type="datetimeFigureOut">
               <a:rPr lang="en-US" smtClean="0"/>
-              <a:t>12/13/2013</a:t>
+              <a:t>12/18/2013</a:t>
             </a:fld>
             <a:endParaRPr lang="en-US"/>
           </a:p>
@@ -593,7 +594,7 @@
           <a:p>
             <a:fld id="{47491EC4-C74A-4DCB-BF28-C0A7248C12D2}" type="datetimeFigureOut">
               <a:rPr lang="en-US" smtClean="0"/>
-              <a:t>12/13/2013</a:t>
+              <a:t>12/18/2013</a:t>
             </a:fld>
             <a:endParaRPr lang="en-US"/>
           </a:p>
@@ -763,7 +764,7 @@
           <a:p>
             <a:fld id="{47491EC4-C74A-4DCB-BF28-C0A7248C12D2}" type="datetimeFigureOut">
               <a:rPr lang="en-US" smtClean="0"/>
-              <a:t>12/13/2013</a:t>
+              <a:t>12/18/2013</a:t>
             </a:fld>
             <a:endParaRPr lang="en-US"/>
           </a:p>
@@ -1009,7 +1010,7 @@
           <a:p>
             <a:fld id="{47491EC4-C74A-4DCB-BF28-C0A7248C12D2}" type="datetimeFigureOut">
               <a:rPr lang="en-US" smtClean="0"/>
-              <a:t>12/13/2013</a:t>
+              <a:t>12/18/2013</a:t>
             </a:fld>
             <a:endParaRPr lang="en-US"/>
           </a:p>
@@ -1241,7 +1242,7 @@
           <a:p>
             <a:fld id="{47491EC4-C74A-4DCB-BF28-C0A7248C12D2}" type="datetimeFigureOut">
               <a:rPr lang="en-US" smtClean="0"/>
-              <a:t>12/13/2013</a:t>
+              <a:t>12/18/2013</a:t>
             </a:fld>
             <a:endParaRPr lang="en-US"/>
           </a:p>
@@ -1608,7 +1609,7 @@
           <a:p>
             <a:fld id="{47491EC4-C74A-4DCB-BF28-C0A7248C12D2}" type="datetimeFigureOut">
               <a:rPr lang="en-US" smtClean="0"/>
-              <a:t>12/13/2013</a:t>
+              <a:t>12/18/2013</a:t>
             </a:fld>
             <a:endParaRPr lang="en-US"/>
           </a:p>
@@ -1726,7 +1727,7 @@
           <a:p>
             <a:fld id="{47491EC4-C74A-4DCB-BF28-C0A7248C12D2}" type="datetimeFigureOut">
               <a:rPr lang="en-US" smtClean="0"/>
-              <a:t>12/13/2013</a:t>
+              <a:t>12/18/2013</a:t>
             </a:fld>
             <a:endParaRPr lang="en-US"/>
           </a:p>
@@ -1821,7 +1822,7 @@
           <a:p>
             <a:fld id="{47491EC4-C74A-4DCB-BF28-C0A7248C12D2}" type="datetimeFigureOut">
               <a:rPr lang="en-US" smtClean="0"/>
-              <a:t>12/13/2013</a:t>
+              <a:t>12/18/2013</a:t>
             </a:fld>
             <a:endParaRPr lang="en-US"/>
           </a:p>
@@ -2098,7 +2099,7 @@
           <a:p>
             <a:fld id="{47491EC4-C74A-4DCB-BF28-C0A7248C12D2}" type="datetimeFigureOut">
               <a:rPr lang="en-US" smtClean="0"/>
-              <a:t>12/13/2013</a:t>
+              <a:t>12/18/2013</a:t>
             </a:fld>
             <a:endParaRPr lang="en-US"/>
           </a:p>
@@ -2351,7 +2352,7 @@
           <a:p>
             <a:fld id="{47491EC4-C74A-4DCB-BF28-C0A7248C12D2}" type="datetimeFigureOut">
               <a:rPr lang="en-US" smtClean="0"/>
-              <a:t>12/13/2013</a:t>
+              <a:t>12/18/2013</a:t>
             </a:fld>
             <a:endParaRPr lang="en-US"/>
           </a:p>
@@ -2564,7 +2565,7 @@
           <a:p>
             <a:fld id="{47491EC4-C74A-4DCB-BF28-C0A7248C12D2}" type="datetimeFigureOut">
               <a:rPr lang="en-US" smtClean="0"/>
-              <a:t>12/13/2013</a:t>
+              <a:t>12/18/2013</a:t>
             </a:fld>
             <a:endParaRPr lang="en-US"/>
           </a:p>
@@ -3148,7 +3149,7 @@
         </p:nvSpPr>
         <p:spPr>
           <a:xfrm>
-            <a:off x="0" y="2347286"/>
+            <a:off x="0" y="2309960"/>
             <a:ext cx="12192000" cy="2159000"/>
           </a:xfrm>
           <a:prstGeom prst="rect">
@@ -4078,7 +4079,7 @@
         </p:nvSpPr>
         <p:spPr>
           <a:xfrm>
-            <a:off x="3986742" y="7097183"/>
+            <a:off x="5603070" y="7097183"/>
             <a:ext cx="1346200" cy="1346200"/>
           </a:xfrm>
           <a:prstGeom prst="roundRect">
@@ -4162,6 +4163,740 @@
           </a:effectRef>
           <a:fontRef idx="minor">
             <a:schemeClr val="dk1"/>
+          </a:fontRef>
+        </p:style>
+        <p:txBody>
+          <a:bodyPr rtlCol="0" anchor="ctr"/>
+          <a:lstStyle/>
+          <a:p>
+            <a:pPr algn="ctr"/>
+            <a:endParaRPr lang="en-US"/>
+          </a:p>
+        </p:txBody>
+      </p:sp>
+      <p:sp>
+        <p:nvSpPr>
+          <p:cNvPr id="25" name="Rounded Rectangle 24"/>
+          <p:cNvSpPr/>
+          <p:nvPr/>
+        </p:nvSpPr>
+        <p:spPr>
+          <a:xfrm>
+            <a:off x="2020814" y="5049254"/>
+            <a:ext cx="1346200" cy="1346200"/>
+          </a:xfrm>
+          <a:prstGeom prst="roundRect">
+            <a:avLst>
+              <a:gd name="adj" fmla="val 16667"/>
+            </a:avLst>
+          </a:prstGeom>
+          <a:solidFill>
+            <a:schemeClr val="bg1"/>
+          </a:solidFill>
+          <a:ln w="28575">
+            <a:noFill/>
+          </a:ln>
+          <a:effectLst/>
+        </p:spPr>
+        <p:style>
+          <a:lnRef idx="2">
+            <a:schemeClr val="accent1">
+              <a:shade val="50000"/>
+            </a:schemeClr>
+          </a:lnRef>
+          <a:fillRef idx="1">
+            <a:schemeClr val="accent1"/>
+          </a:fillRef>
+          <a:effectRef idx="0">
+            <a:schemeClr val="accent1"/>
+          </a:effectRef>
+          <a:fontRef idx="minor">
+            <a:schemeClr val="lt1"/>
+          </a:fontRef>
+        </p:style>
+        <p:txBody>
+          <a:bodyPr rtlCol="0" anchor="ctr"/>
+          <a:lstStyle/>
+          <a:p>
+            <a:pPr algn="ctr"/>
+            <a:endParaRPr lang="en-US"/>
+          </a:p>
+        </p:txBody>
+      </p:sp>
+      <p:sp>
+        <p:nvSpPr>
+          <p:cNvPr id="26" name="Rounded Rectangle 25"/>
+          <p:cNvSpPr/>
+          <p:nvPr/>
+        </p:nvSpPr>
+        <p:spPr>
+          <a:xfrm>
+            <a:off x="9253927" y="7233879"/>
+            <a:ext cx="1346200" cy="1346200"/>
+          </a:xfrm>
+          <a:prstGeom prst="roundRect">
+            <a:avLst>
+              <a:gd name="adj" fmla="val 16667"/>
+            </a:avLst>
+          </a:prstGeom>
+          <a:solidFill>
+            <a:srgbClr val="8598A9"/>
+          </a:solidFill>
+          <a:ln w="28575">
+            <a:noFill/>
+          </a:ln>
+          <a:effectLst>
+            <a:outerShdw blurRad="50800" dist="38100" dir="2700000" sx="101000" sy="101000" algn="tl" rotWithShape="0">
+              <a:prstClr val="black">
+                <a:alpha val="1000"/>
+              </a:prstClr>
+            </a:outerShdw>
+          </a:effectLst>
+        </p:spPr>
+        <p:style>
+          <a:lnRef idx="2">
+            <a:schemeClr val="accent1">
+              <a:shade val="50000"/>
+            </a:schemeClr>
+          </a:lnRef>
+          <a:fillRef idx="1">
+            <a:schemeClr val="accent1"/>
+          </a:fillRef>
+          <a:effectRef idx="0">
+            <a:schemeClr val="accent1"/>
+          </a:effectRef>
+          <a:fontRef idx="minor">
+            <a:schemeClr val="lt1"/>
+          </a:fontRef>
+        </p:style>
+        <p:txBody>
+          <a:bodyPr rtlCol="0" anchor="ctr"/>
+          <a:lstStyle/>
+          <a:p>
+            <a:pPr algn="ctr"/>
+            <a:endParaRPr lang="en-US"/>
+          </a:p>
+        </p:txBody>
+      </p:sp>
+      <p:sp>
+        <p:nvSpPr>
+          <p:cNvPr id="24" name="Rounded Rectangle 23"/>
+          <p:cNvSpPr/>
+          <p:nvPr/>
+        </p:nvSpPr>
+        <p:spPr>
+          <a:xfrm>
+            <a:off x="10600127" y="7235445"/>
+            <a:ext cx="1346200" cy="1346200"/>
+          </a:xfrm>
+          <a:prstGeom prst="roundRect">
+            <a:avLst>
+              <a:gd name="adj" fmla="val 16667"/>
+            </a:avLst>
+          </a:prstGeom>
+          <a:gradFill>
+            <a:gsLst>
+              <a:gs pos="0">
+                <a:schemeClr val="tx1">
+                  <a:alpha val="0"/>
+                </a:schemeClr>
+              </a:gs>
+              <a:gs pos="100000">
+                <a:srgbClr val="000000">
+                  <a:alpha val="32000"/>
+                </a:srgbClr>
+              </a:gs>
+            </a:gsLst>
+            <a:lin ang="5400000" scaled="1"/>
+          </a:gradFill>
+          <a:ln w="28575">
+            <a:solidFill>
+              <a:schemeClr val="tx1"/>
+            </a:solidFill>
+          </a:ln>
+          <a:effectLst>
+            <a:outerShdw blurRad="50800" dist="38100" dir="2700000" sx="101000" sy="101000" algn="tl" rotWithShape="0">
+              <a:schemeClr val="bg1">
+                <a:alpha val="40000"/>
+              </a:schemeClr>
+            </a:outerShdw>
+          </a:effectLst>
+        </p:spPr>
+        <p:style>
+          <a:lnRef idx="2">
+            <a:schemeClr val="accent1">
+              <a:shade val="50000"/>
+            </a:schemeClr>
+          </a:lnRef>
+          <a:fillRef idx="1">
+            <a:schemeClr val="accent1"/>
+          </a:fillRef>
+          <a:effectRef idx="0">
+            <a:schemeClr val="accent1"/>
+          </a:effectRef>
+          <a:fontRef idx="minor">
+            <a:schemeClr val="lt1"/>
+          </a:fontRef>
+        </p:style>
+        <p:txBody>
+          <a:bodyPr rtlCol="0" anchor="ctr"/>
+          <a:lstStyle/>
+          <a:p>
+            <a:pPr algn="ctr"/>
+            <a:endParaRPr lang="en-US"/>
+          </a:p>
+        </p:txBody>
+      </p:sp>
+      <p:sp>
+        <p:nvSpPr>
+          <p:cNvPr id="3" name="Rectangle 2"/>
+          <p:cNvSpPr/>
+          <p:nvPr/>
+        </p:nvSpPr>
+        <p:spPr>
+          <a:xfrm>
+            <a:off x="1985885" y="2788212"/>
+            <a:ext cx="1346200" cy="1348284"/>
+          </a:xfrm>
+          <a:prstGeom prst="rect">
+            <a:avLst/>
+          </a:prstGeom>
+          <a:gradFill>
+            <a:gsLst>
+              <a:gs pos="0">
+                <a:srgbClr val="FDFDFD"/>
+              </a:gs>
+              <a:gs pos="100000">
+                <a:srgbClr val="B7B7B8"/>
+              </a:gs>
+            </a:gsLst>
+            <a:lin ang="5400000" scaled="1"/>
+          </a:gradFill>
+          <a:ln w="28575">
+            <a:solidFill>
+              <a:schemeClr val="tx1"/>
+            </a:solidFill>
+          </a:ln>
+          <a:effectLst>
+            <a:outerShdw blurRad="50800" dist="38100" dir="5400000" sx="101000" sy="101000" algn="t" rotWithShape="0">
+              <a:schemeClr val="bg1">
+                <a:alpha val="40000"/>
+              </a:schemeClr>
+            </a:outerShdw>
+          </a:effectLst>
+        </p:spPr>
+        <p:style>
+          <a:lnRef idx="2">
+            <a:schemeClr val="accent1">
+              <a:shade val="50000"/>
+            </a:schemeClr>
+          </a:lnRef>
+          <a:fillRef idx="1">
+            <a:schemeClr val="accent1"/>
+          </a:fillRef>
+          <a:effectRef idx="0">
+            <a:schemeClr val="accent1"/>
+          </a:effectRef>
+          <a:fontRef idx="minor">
+            <a:schemeClr val="lt1"/>
+          </a:fontRef>
+        </p:style>
+        <p:txBody>
+          <a:bodyPr rtlCol="0" anchor="ctr"/>
+          <a:lstStyle/>
+          <a:p>
+            <a:pPr algn="ctr"/>
+            <a:endParaRPr lang="en-US"/>
+          </a:p>
+        </p:txBody>
+      </p:sp>
+      <p:sp>
+        <p:nvSpPr>
+          <p:cNvPr id="30" name="Round Same Side Corner Rectangle 29"/>
+          <p:cNvSpPr/>
+          <p:nvPr/>
+        </p:nvSpPr>
+        <p:spPr>
+          <a:xfrm rot="5400000">
+            <a:off x="3325849" y="2784610"/>
+            <a:ext cx="1348285" cy="1351322"/>
+          </a:xfrm>
+          <a:prstGeom prst="round2SameRect">
+            <a:avLst/>
+          </a:prstGeom>
+          <a:gradFill>
+            <a:gsLst>
+              <a:gs pos="0">
+                <a:srgbClr val="FDFDFD"/>
+              </a:gs>
+              <a:gs pos="100000">
+                <a:srgbClr val="B7B7B8"/>
+              </a:gs>
+            </a:gsLst>
+            <a:lin ang="0" scaled="0"/>
+          </a:gradFill>
+          <a:ln w="28575">
+            <a:solidFill>
+              <a:schemeClr val="tx1"/>
+            </a:solidFill>
+          </a:ln>
+          <a:effectLst>
+            <a:outerShdw blurRad="50800" dist="38100" dir="2700000" sx="101000" sy="101000" algn="tl" rotWithShape="0">
+              <a:schemeClr val="bg1">
+                <a:alpha val="40000"/>
+              </a:schemeClr>
+            </a:outerShdw>
+          </a:effectLst>
+        </p:spPr>
+        <p:style>
+          <a:lnRef idx="2">
+            <a:schemeClr val="accent1">
+              <a:shade val="50000"/>
+            </a:schemeClr>
+          </a:lnRef>
+          <a:fillRef idx="1">
+            <a:schemeClr val="accent1"/>
+          </a:fillRef>
+          <a:effectRef idx="0">
+            <a:schemeClr val="accent1"/>
+          </a:effectRef>
+          <a:fontRef idx="minor">
+            <a:schemeClr val="lt1"/>
+          </a:fontRef>
+        </p:style>
+        <p:txBody>
+          <a:bodyPr rtlCol="0" anchor="ctr"/>
+          <a:lstStyle/>
+          <a:p>
+            <a:pPr algn="ctr"/>
+            <a:endParaRPr lang="en-US"/>
+          </a:p>
+        </p:txBody>
+      </p:sp>
+      <p:sp>
+        <p:nvSpPr>
+          <p:cNvPr id="32" name="Round Same Side Corner Rectangle 31"/>
+          <p:cNvSpPr/>
+          <p:nvPr/>
+        </p:nvSpPr>
+        <p:spPr>
+          <a:xfrm rot="16200000">
+            <a:off x="5046698" y="2782064"/>
+            <a:ext cx="1353376" cy="1351322"/>
+          </a:xfrm>
+          <a:prstGeom prst="round2SameRect">
+            <a:avLst/>
+          </a:prstGeom>
+          <a:gradFill>
+            <a:gsLst>
+              <a:gs pos="0">
+                <a:srgbClr val="91A3B4"/>
+              </a:gs>
+              <a:gs pos="100000">
+                <a:srgbClr val="526D84"/>
+              </a:gs>
+            </a:gsLst>
+            <a:lin ang="10800000" scaled="0"/>
+          </a:gradFill>
+          <a:ln w="28575">
+            <a:solidFill>
+              <a:schemeClr val="tx1"/>
+            </a:solidFill>
+          </a:ln>
+          <a:effectLst>
+            <a:outerShdw blurRad="50800" dist="38100" dir="5400000" sx="101000" sy="101000" algn="t" rotWithShape="0">
+              <a:schemeClr val="bg1">
+                <a:alpha val="40000"/>
+              </a:schemeClr>
+            </a:outerShdw>
+          </a:effectLst>
+        </p:spPr>
+        <p:style>
+          <a:lnRef idx="2">
+            <a:schemeClr val="accent1">
+              <a:shade val="50000"/>
+            </a:schemeClr>
+          </a:lnRef>
+          <a:fillRef idx="1">
+            <a:schemeClr val="accent1"/>
+          </a:fillRef>
+          <a:effectRef idx="0">
+            <a:schemeClr val="accent1"/>
+          </a:effectRef>
+          <a:fontRef idx="minor">
+            <a:schemeClr val="lt1"/>
+          </a:fontRef>
+        </p:style>
+        <p:txBody>
+          <a:bodyPr rtlCol="0" anchor="ctr"/>
+          <a:lstStyle/>
+          <a:p>
+            <a:pPr algn="ctr"/>
+            <a:endParaRPr lang="en-US"/>
+          </a:p>
+        </p:txBody>
+      </p:sp>
+      <p:sp>
+        <p:nvSpPr>
+          <p:cNvPr id="38" name="Rectangle 37"/>
+          <p:cNvSpPr/>
+          <p:nvPr/>
+        </p:nvSpPr>
+        <p:spPr>
+          <a:xfrm>
+            <a:off x="6393925" y="2781036"/>
+            <a:ext cx="1359074" cy="1353377"/>
+          </a:xfrm>
+          <a:prstGeom prst="rect">
+            <a:avLst/>
+          </a:prstGeom>
+          <a:gradFill>
+            <a:gsLst>
+              <a:gs pos="0">
+                <a:srgbClr val="91A3B4"/>
+              </a:gs>
+              <a:gs pos="100000">
+                <a:srgbClr val="526D84"/>
+              </a:gs>
+            </a:gsLst>
+            <a:lin ang="5400000" scaled="1"/>
+          </a:gradFill>
+          <a:ln w="28575">
+            <a:solidFill>
+              <a:schemeClr val="tx1"/>
+            </a:solidFill>
+          </a:ln>
+          <a:effectLst>
+            <a:outerShdw blurRad="50800" dist="38100" dir="5400000" sx="101000" sy="101000" algn="t" rotWithShape="0">
+              <a:schemeClr val="bg1">
+                <a:alpha val="40000"/>
+              </a:schemeClr>
+            </a:outerShdw>
+          </a:effectLst>
+        </p:spPr>
+        <p:style>
+          <a:lnRef idx="2">
+            <a:schemeClr val="accent1">
+              <a:shade val="50000"/>
+            </a:schemeClr>
+          </a:lnRef>
+          <a:fillRef idx="1">
+            <a:schemeClr val="accent1"/>
+          </a:fillRef>
+          <a:effectRef idx="0">
+            <a:schemeClr val="accent1"/>
+          </a:effectRef>
+          <a:fontRef idx="minor">
+            <a:schemeClr val="lt1"/>
+          </a:fontRef>
+        </p:style>
+        <p:txBody>
+          <a:bodyPr rtlCol="0" anchor="ctr"/>
+          <a:lstStyle/>
+          <a:p>
+            <a:pPr algn="ctr"/>
+            <a:endParaRPr lang="en-US"/>
+          </a:p>
+        </p:txBody>
+      </p:sp>
+      <p:sp>
+        <p:nvSpPr>
+          <p:cNvPr id="42" name="Round Same Side Corner Rectangle 41"/>
+          <p:cNvSpPr/>
+          <p:nvPr/>
+        </p:nvSpPr>
+        <p:spPr>
+          <a:xfrm rot="5400000">
+            <a:off x="7751971" y="2782063"/>
+            <a:ext cx="1353378" cy="1351322"/>
+          </a:xfrm>
+          <a:prstGeom prst="round2SameRect">
+            <a:avLst/>
+          </a:prstGeom>
+          <a:gradFill>
+            <a:gsLst>
+              <a:gs pos="0">
+                <a:srgbClr val="91A3B4"/>
+              </a:gs>
+              <a:gs pos="100000">
+                <a:srgbClr val="526D84"/>
+              </a:gs>
+            </a:gsLst>
+            <a:lin ang="0" scaled="0"/>
+          </a:gradFill>
+          <a:ln w="28575">
+            <a:solidFill>
+              <a:schemeClr val="tx1"/>
+            </a:solidFill>
+          </a:ln>
+          <a:effectLst>
+            <a:outerShdw blurRad="50800" dist="38100" dir="2700000" sx="101000" sy="101000" algn="tl" rotWithShape="0">
+              <a:schemeClr val="bg1">
+                <a:alpha val="40000"/>
+              </a:schemeClr>
+            </a:outerShdw>
+          </a:effectLst>
+        </p:spPr>
+        <p:style>
+          <a:lnRef idx="2">
+            <a:schemeClr val="accent1">
+              <a:shade val="50000"/>
+            </a:schemeClr>
+          </a:lnRef>
+          <a:fillRef idx="1">
+            <a:schemeClr val="accent1"/>
+          </a:fillRef>
+          <a:effectRef idx="0">
+            <a:schemeClr val="accent1"/>
+          </a:effectRef>
+          <a:fontRef idx="minor">
+            <a:schemeClr val="lt1"/>
+          </a:fontRef>
+        </p:style>
+        <p:txBody>
+          <a:bodyPr rtlCol="0" anchor="ctr"/>
+          <a:lstStyle/>
+          <a:p>
+            <a:pPr algn="ctr"/>
+            <a:endParaRPr lang="en-US"/>
+          </a:p>
+        </p:txBody>
+      </p:sp>
+      <p:sp>
+        <p:nvSpPr>
+          <p:cNvPr id="2" name="Round Same Side Corner Rectangle 1"/>
+          <p:cNvSpPr/>
+          <p:nvPr/>
+        </p:nvSpPr>
+        <p:spPr>
+          <a:xfrm rot="16200000">
+            <a:off x="631932" y="2788214"/>
+            <a:ext cx="1346202" cy="1346199"/>
+          </a:xfrm>
+          <a:prstGeom prst="round2SameRect">
+            <a:avLst/>
+          </a:prstGeom>
+          <a:gradFill>
+            <a:gsLst>
+              <a:gs pos="0">
+                <a:srgbClr val="FDFDFD"/>
+              </a:gs>
+              <a:gs pos="100000">
+                <a:srgbClr val="B7B7B8"/>
+              </a:gs>
+            </a:gsLst>
+            <a:lin ang="10800000" scaled="0"/>
+          </a:gradFill>
+          <a:ln w="28575">
+            <a:solidFill>
+              <a:schemeClr val="tx1"/>
+            </a:solidFill>
+          </a:ln>
+          <a:effectLst>
+            <a:outerShdw blurRad="50800" dist="38100" dir="5400000" sx="101000" sy="101000" algn="t" rotWithShape="0">
+              <a:schemeClr val="bg1">
+                <a:alpha val="40000"/>
+              </a:schemeClr>
+            </a:outerShdw>
+          </a:effectLst>
+        </p:spPr>
+        <p:style>
+          <a:lnRef idx="2">
+            <a:schemeClr val="accent1">
+              <a:shade val="50000"/>
+            </a:schemeClr>
+          </a:lnRef>
+          <a:fillRef idx="1">
+            <a:schemeClr val="accent1"/>
+          </a:fillRef>
+          <a:effectRef idx="0">
+            <a:schemeClr val="accent1"/>
+          </a:effectRef>
+          <a:fontRef idx="minor">
+            <a:schemeClr val="lt1"/>
+          </a:fontRef>
+        </p:style>
+        <p:txBody>
+          <a:bodyPr rtlCol="0" anchor="ctr"/>
+          <a:lstStyle/>
+          <a:p>
+            <a:pPr algn="ctr"/>
+            <a:endParaRPr lang="en-US"/>
+          </a:p>
+        </p:txBody>
+      </p:sp>
+      <p:sp>
+        <p:nvSpPr>
+          <p:cNvPr id="43" name="Round Same Side Corner Rectangle 42"/>
+          <p:cNvSpPr/>
+          <p:nvPr/>
+        </p:nvSpPr>
+        <p:spPr>
+          <a:xfrm rot="16200000">
+            <a:off x="5046698" y="2780649"/>
+            <a:ext cx="1353376" cy="1351322"/>
+          </a:xfrm>
+          <a:prstGeom prst="round2SameRect">
+            <a:avLst/>
+          </a:prstGeom>
+          <a:gradFill>
+            <a:gsLst>
+              <a:gs pos="0">
+                <a:srgbClr val="91A3B4"/>
+              </a:gs>
+              <a:gs pos="100000">
+                <a:srgbClr val="526D84"/>
+              </a:gs>
+            </a:gsLst>
+            <a:lin ang="10800000" scaled="0"/>
+          </a:gradFill>
+          <a:ln w="28575">
+            <a:solidFill>
+              <a:schemeClr val="tx1"/>
+            </a:solidFill>
+          </a:ln>
+          <a:effectLst>
+            <a:innerShdw blurRad="266700">
+              <a:prstClr val="black"/>
+            </a:innerShdw>
+          </a:effectLst>
+        </p:spPr>
+        <p:style>
+          <a:lnRef idx="2">
+            <a:schemeClr val="accent1">
+              <a:shade val="50000"/>
+            </a:schemeClr>
+          </a:lnRef>
+          <a:fillRef idx="1">
+            <a:schemeClr val="accent1"/>
+          </a:fillRef>
+          <a:effectRef idx="0">
+            <a:schemeClr val="accent1"/>
+          </a:effectRef>
+          <a:fontRef idx="minor">
+            <a:schemeClr val="lt1"/>
+          </a:fontRef>
+        </p:style>
+        <p:txBody>
+          <a:bodyPr rtlCol="0" anchor="ctr"/>
+          <a:lstStyle/>
+          <a:p>
+            <a:pPr algn="ctr"/>
+            <a:endParaRPr lang="en-US"/>
+          </a:p>
+        </p:txBody>
+      </p:sp>
+      <p:sp>
+        <p:nvSpPr>
+          <p:cNvPr id="44" name="Rectangle 43"/>
+          <p:cNvSpPr/>
+          <p:nvPr/>
+        </p:nvSpPr>
+        <p:spPr>
+          <a:xfrm>
+            <a:off x="6393925" y="2779621"/>
+            <a:ext cx="1359074" cy="1353377"/>
+          </a:xfrm>
+          <a:prstGeom prst="rect">
+            <a:avLst/>
+          </a:prstGeom>
+          <a:gradFill>
+            <a:gsLst>
+              <a:gs pos="0">
+                <a:srgbClr val="91A3B4"/>
+              </a:gs>
+              <a:gs pos="100000">
+                <a:srgbClr val="526D84"/>
+              </a:gs>
+            </a:gsLst>
+            <a:lin ang="5400000" scaled="1"/>
+          </a:gradFill>
+          <a:ln w="28575">
+            <a:solidFill>
+              <a:schemeClr val="tx1"/>
+            </a:solidFill>
+          </a:ln>
+          <a:effectLst>
+            <a:innerShdw blurRad="266700">
+              <a:prstClr val="black"/>
+            </a:innerShdw>
+          </a:effectLst>
+        </p:spPr>
+        <p:style>
+          <a:lnRef idx="2">
+            <a:schemeClr val="accent1">
+              <a:shade val="50000"/>
+            </a:schemeClr>
+          </a:lnRef>
+          <a:fillRef idx="1">
+            <a:schemeClr val="accent1"/>
+          </a:fillRef>
+          <a:effectRef idx="0">
+            <a:schemeClr val="accent1"/>
+          </a:effectRef>
+          <a:fontRef idx="minor">
+            <a:schemeClr val="lt1"/>
+          </a:fontRef>
+        </p:style>
+        <p:txBody>
+          <a:bodyPr rtlCol="0" anchor="ctr"/>
+          <a:lstStyle/>
+          <a:p>
+            <a:pPr algn="ctr"/>
+            <a:endParaRPr lang="en-US"/>
+          </a:p>
+        </p:txBody>
+      </p:sp>
+      <p:sp>
+        <p:nvSpPr>
+          <p:cNvPr id="45" name="Round Same Side Corner Rectangle 44"/>
+          <p:cNvSpPr/>
+          <p:nvPr/>
+        </p:nvSpPr>
+        <p:spPr>
+          <a:xfrm rot="5400000">
+            <a:off x="7751971" y="2780648"/>
+            <a:ext cx="1353378" cy="1351322"/>
+          </a:xfrm>
+          <a:prstGeom prst="round2SameRect">
+            <a:avLst/>
+          </a:prstGeom>
+          <a:gradFill>
+            <a:gsLst>
+              <a:gs pos="0">
+                <a:srgbClr val="91A3B4"/>
+              </a:gs>
+              <a:gs pos="100000">
+                <a:srgbClr val="526D84"/>
+              </a:gs>
+            </a:gsLst>
+            <a:lin ang="0" scaled="0"/>
+          </a:gradFill>
+          <a:ln w="28575">
+            <a:solidFill>
+              <a:schemeClr val="tx1"/>
+            </a:solidFill>
+          </a:ln>
+          <a:effectLst>
+            <a:innerShdw blurRad="266700">
+              <a:prstClr val="black"/>
+            </a:innerShdw>
+          </a:effectLst>
+        </p:spPr>
+        <p:style>
+          <a:lnRef idx="2">
+            <a:schemeClr val="accent1">
+              <a:shade val="50000"/>
+            </a:schemeClr>
+          </a:lnRef>
+          <a:fillRef idx="1">
+            <a:schemeClr val="accent1"/>
+          </a:fillRef>
+          <a:effectRef idx="0">
+            <a:schemeClr val="accent1"/>
+          </a:effectRef>
+          <a:fontRef idx="minor">
+            <a:schemeClr val="lt1"/>
           </a:fontRef>
         </p:style>
         <p:txBody>
@@ -4190,6 +4925,1248 @@
       </p:par>
     </p:tnLst>
   </p:timing>
+</p:sld>
+</file>
+
+<file path=ppt/slides/slide2.xml><?xml version="1.0" encoding="utf-8"?>
+<p:sld xmlns:a="http://schemas.openxmlformats.org/drawingml/2006/main" xmlns:r="http://schemas.openxmlformats.org/officeDocument/2006/relationships" xmlns:p="http://schemas.openxmlformats.org/presentationml/2006/main">
+  <p:cSld>
+    <p:spTree>
+      <p:nvGrpSpPr>
+        <p:cNvPr id="1" name=""/>
+        <p:cNvGrpSpPr/>
+        <p:nvPr/>
+      </p:nvGrpSpPr>
+      <p:grpSpPr>
+        <a:xfrm>
+          <a:off x="0" y="0"/>
+          <a:ext cx="0" cy="0"/>
+          <a:chOff x="0" y="0"/>
+          <a:chExt cx="0" cy="0"/>
+        </a:xfrm>
+      </p:grpSpPr>
+      <p:sp>
+        <p:nvSpPr>
+          <p:cNvPr id="4" name="Rectangle 3"/>
+          <p:cNvSpPr/>
+          <p:nvPr/>
+        </p:nvSpPr>
+        <p:spPr>
+          <a:xfrm>
+            <a:off x="0" y="299533"/>
+            <a:ext cx="12192000" cy="2159000"/>
+          </a:xfrm>
+          <a:prstGeom prst="rect">
+            <a:avLst/>
+          </a:prstGeom>
+          <a:solidFill>
+            <a:schemeClr val="bg1">
+              <a:lumMod val="75000"/>
+            </a:schemeClr>
+          </a:solidFill>
+        </p:spPr>
+        <p:style>
+          <a:lnRef idx="2">
+            <a:schemeClr val="accent1">
+              <a:shade val="50000"/>
+            </a:schemeClr>
+          </a:lnRef>
+          <a:fillRef idx="1">
+            <a:schemeClr val="accent1"/>
+          </a:fillRef>
+          <a:effectRef idx="0">
+            <a:schemeClr val="accent1"/>
+          </a:effectRef>
+          <a:fontRef idx="minor">
+            <a:schemeClr val="lt1"/>
+          </a:fontRef>
+        </p:style>
+        <p:txBody>
+          <a:bodyPr rtlCol="0" anchor="ctr"/>
+          <a:lstStyle/>
+          <a:p>
+            <a:pPr algn="ctr"/>
+            <a:endParaRPr lang="en-US"/>
+          </a:p>
+        </p:txBody>
+      </p:sp>
+      <p:sp>
+        <p:nvSpPr>
+          <p:cNvPr id="7" name="Rectangle 6"/>
+          <p:cNvSpPr/>
+          <p:nvPr/>
+        </p:nvSpPr>
+        <p:spPr>
+          <a:xfrm>
+            <a:off x="1985885" y="777785"/>
+            <a:ext cx="1346200" cy="1348284"/>
+          </a:xfrm>
+          <a:prstGeom prst="rect">
+            <a:avLst/>
+          </a:prstGeom>
+          <a:gradFill>
+            <a:gsLst>
+              <a:gs pos="0">
+                <a:srgbClr val="FDFDFD"/>
+              </a:gs>
+              <a:gs pos="100000">
+                <a:srgbClr val="B7B7B8"/>
+              </a:gs>
+            </a:gsLst>
+            <a:lin ang="5400000" scaled="1"/>
+          </a:gradFill>
+          <a:ln w="28575">
+            <a:solidFill>
+              <a:schemeClr val="tx1"/>
+            </a:solidFill>
+          </a:ln>
+          <a:effectLst>
+            <a:outerShdw blurRad="50800" dist="38100" dir="5400000" sx="101000" sy="101000" algn="t" rotWithShape="0">
+              <a:schemeClr val="bg1">
+                <a:alpha val="40000"/>
+              </a:schemeClr>
+            </a:outerShdw>
+          </a:effectLst>
+        </p:spPr>
+        <p:style>
+          <a:lnRef idx="2">
+            <a:schemeClr val="accent1">
+              <a:shade val="50000"/>
+            </a:schemeClr>
+          </a:lnRef>
+          <a:fillRef idx="1">
+            <a:schemeClr val="accent1"/>
+          </a:fillRef>
+          <a:effectRef idx="0">
+            <a:schemeClr val="accent1"/>
+          </a:effectRef>
+          <a:fontRef idx="minor">
+            <a:schemeClr val="lt1"/>
+          </a:fontRef>
+        </p:style>
+        <p:txBody>
+          <a:bodyPr rtlCol="0" anchor="ctr"/>
+          <a:lstStyle/>
+          <a:p>
+            <a:pPr algn="ctr"/>
+            <a:endParaRPr lang="en-US"/>
+          </a:p>
+        </p:txBody>
+      </p:sp>
+      <p:sp>
+        <p:nvSpPr>
+          <p:cNvPr id="8" name="Round Same Side Corner Rectangle 7"/>
+          <p:cNvSpPr/>
+          <p:nvPr/>
+        </p:nvSpPr>
+        <p:spPr>
+          <a:xfrm rot="5400000">
+            <a:off x="3325849" y="774183"/>
+            <a:ext cx="1348285" cy="1351322"/>
+          </a:xfrm>
+          <a:prstGeom prst="round2SameRect">
+            <a:avLst/>
+          </a:prstGeom>
+          <a:gradFill>
+            <a:gsLst>
+              <a:gs pos="0">
+                <a:srgbClr val="FDFDFD"/>
+              </a:gs>
+              <a:gs pos="100000">
+                <a:srgbClr val="B7B7B8"/>
+              </a:gs>
+            </a:gsLst>
+            <a:lin ang="0" scaled="0"/>
+          </a:gradFill>
+          <a:ln w="28575">
+            <a:solidFill>
+              <a:schemeClr val="tx1"/>
+            </a:solidFill>
+          </a:ln>
+          <a:effectLst>
+            <a:outerShdw blurRad="50800" dist="38100" dir="2700000" sx="101000" sy="101000" algn="tl" rotWithShape="0">
+              <a:schemeClr val="bg1">
+                <a:alpha val="40000"/>
+              </a:schemeClr>
+            </a:outerShdw>
+          </a:effectLst>
+        </p:spPr>
+        <p:style>
+          <a:lnRef idx="2">
+            <a:schemeClr val="accent1">
+              <a:shade val="50000"/>
+            </a:schemeClr>
+          </a:lnRef>
+          <a:fillRef idx="1">
+            <a:schemeClr val="accent1"/>
+          </a:fillRef>
+          <a:effectRef idx="0">
+            <a:schemeClr val="accent1"/>
+          </a:effectRef>
+          <a:fontRef idx="minor">
+            <a:schemeClr val="lt1"/>
+          </a:fontRef>
+        </p:style>
+        <p:txBody>
+          <a:bodyPr rtlCol="0" anchor="ctr"/>
+          <a:lstStyle/>
+          <a:p>
+            <a:pPr algn="ctr"/>
+            <a:endParaRPr lang="en-US"/>
+          </a:p>
+        </p:txBody>
+      </p:sp>
+      <p:sp>
+        <p:nvSpPr>
+          <p:cNvPr id="9" name="Round Same Side Corner Rectangle 8"/>
+          <p:cNvSpPr/>
+          <p:nvPr/>
+        </p:nvSpPr>
+        <p:spPr>
+          <a:xfrm rot="16200000">
+            <a:off x="7733531" y="704081"/>
+            <a:ext cx="1353376" cy="1351322"/>
+          </a:xfrm>
+          <a:prstGeom prst="round2SameRect">
+            <a:avLst/>
+          </a:prstGeom>
+          <a:gradFill>
+            <a:gsLst>
+              <a:gs pos="0">
+                <a:srgbClr val="91A3B4"/>
+              </a:gs>
+              <a:gs pos="100000">
+                <a:srgbClr val="526D84"/>
+              </a:gs>
+            </a:gsLst>
+            <a:lin ang="10800000" scaled="0"/>
+          </a:gradFill>
+          <a:ln w="28575">
+            <a:solidFill>
+              <a:schemeClr val="tx1"/>
+            </a:solidFill>
+          </a:ln>
+          <a:effectLst>
+            <a:outerShdw blurRad="50800" dist="38100" dir="5400000" sx="101000" sy="101000" algn="t" rotWithShape="0">
+              <a:schemeClr val="bg1">
+                <a:alpha val="40000"/>
+              </a:schemeClr>
+            </a:outerShdw>
+          </a:effectLst>
+        </p:spPr>
+        <p:style>
+          <a:lnRef idx="2">
+            <a:schemeClr val="accent1">
+              <a:shade val="50000"/>
+            </a:schemeClr>
+          </a:lnRef>
+          <a:fillRef idx="1">
+            <a:schemeClr val="accent1"/>
+          </a:fillRef>
+          <a:effectRef idx="0">
+            <a:schemeClr val="accent1"/>
+          </a:effectRef>
+          <a:fontRef idx="minor">
+            <a:schemeClr val="lt1"/>
+          </a:fontRef>
+        </p:style>
+        <p:txBody>
+          <a:bodyPr rtlCol="0" anchor="ctr"/>
+          <a:lstStyle/>
+          <a:p>
+            <a:pPr algn="ctr"/>
+            <a:endParaRPr lang="en-US"/>
+          </a:p>
+        </p:txBody>
+      </p:sp>
+      <p:sp>
+        <p:nvSpPr>
+          <p:cNvPr id="10" name="Rectangle 9"/>
+          <p:cNvSpPr/>
+          <p:nvPr/>
+        </p:nvSpPr>
+        <p:spPr>
+          <a:xfrm>
+            <a:off x="9080758" y="703053"/>
+            <a:ext cx="1359074" cy="1353377"/>
+          </a:xfrm>
+          <a:prstGeom prst="rect">
+            <a:avLst/>
+          </a:prstGeom>
+          <a:gradFill>
+            <a:gsLst>
+              <a:gs pos="0">
+                <a:srgbClr val="91A3B4"/>
+              </a:gs>
+              <a:gs pos="100000">
+                <a:srgbClr val="526D84"/>
+              </a:gs>
+            </a:gsLst>
+            <a:lin ang="5400000" scaled="1"/>
+          </a:gradFill>
+          <a:ln w="28575">
+            <a:solidFill>
+              <a:schemeClr val="tx1"/>
+            </a:solidFill>
+          </a:ln>
+          <a:effectLst>
+            <a:outerShdw blurRad="50800" dist="38100" dir="5400000" sx="101000" sy="101000" algn="t" rotWithShape="0">
+              <a:schemeClr val="bg1">
+                <a:alpha val="40000"/>
+              </a:schemeClr>
+            </a:outerShdw>
+          </a:effectLst>
+        </p:spPr>
+        <p:style>
+          <a:lnRef idx="2">
+            <a:schemeClr val="accent1">
+              <a:shade val="50000"/>
+            </a:schemeClr>
+          </a:lnRef>
+          <a:fillRef idx="1">
+            <a:schemeClr val="accent1"/>
+          </a:fillRef>
+          <a:effectRef idx="0">
+            <a:schemeClr val="accent1"/>
+          </a:effectRef>
+          <a:fontRef idx="minor">
+            <a:schemeClr val="lt1"/>
+          </a:fontRef>
+        </p:style>
+        <p:txBody>
+          <a:bodyPr rtlCol="0" anchor="ctr"/>
+          <a:lstStyle/>
+          <a:p>
+            <a:pPr algn="ctr"/>
+            <a:endParaRPr lang="en-US"/>
+          </a:p>
+        </p:txBody>
+      </p:sp>
+      <p:sp>
+        <p:nvSpPr>
+          <p:cNvPr id="11" name="Round Same Side Corner Rectangle 10"/>
+          <p:cNvSpPr/>
+          <p:nvPr/>
+        </p:nvSpPr>
+        <p:spPr>
+          <a:xfrm rot="5400000">
+            <a:off x="10438804" y="704080"/>
+            <a:ext cx="1353378" cy="1351322"/>
+          </a:xfrm>
+          <a:prstGeom prst="round2SameRect">
+            <a:avLst/>
+          </a:prstGeom>
+          <a:gradFill>
+            <a:gsLst>
+              <a:gs pos="0">
+                <a:srgbClr val="91A3B4"/>
+              </a:gs>
+              <a:gs pos="100000">
+                <a:srgbClr val="526D84"/>
+              </a:gs>
+            </a:gsLst>
+            <a:lin ang="0" scaled="0"/>
+          </a:gradFill>
+          <a:ln w="28575">
+            <a:solidFill>
+              <a:schemeClr val="tx1"/>
+            </a:solidFill>
+          </a:ln>
+          <a:effectLst>
+            <a:outerShdw blurRad="50800" dist="38100" dir="2700000" sx="101000" sy="101000" algn="tl" rotWithShape="0">
+              <a:schemeClr val="bg1">
+                <a:alpha val="40000"/>
+              </a:schemeClr>
+            </a:outerShdw>
+          </a:effectLst>
+        </p:spPr>
+        <p:style>
+          <a:lnRef idx="2">
+            <a:schemeClr val="accent1">
+              <a:shade val="50000"/>
+            </a:schemeClr>
+          </a:lnRef>
+          <a:fillRef idx="1">
+            <a:schemeClr val="accent1"/>
+          </a:fillRef>
+          <a:effectRef idx="0">
+            <a:schemeClr val="accent1"/>
+          </a:effectRef>
+          <a:fontRef idx="minor">
+            <a:schemeClr val="lt1"/>
+          </a:fontRef>
+        </p:style>
+        <p:txBody>
+          <a:bodyPr rtlCol="0" anchor="ctr"/>
+          <a:lstStyle/>
+          <a:p>
+            <a:pPr algn="ctr"/>
+            <a:endParaRPr lang="en-US"/>
+          </a:p>
+        </p:txBody>
+      </p:sp>
+      <p:sp>
+        <p:nvSpPr>
+          <p:cNvPr id="12" name="Round Same Side Corner Rectangle 11"/>
+          <p:cNvSpPr/>
+          <p:nvPr/>
+        </p:nvSpPr>
+        <p:spPr>
+          <a:xfrm rot="16200000">
+            <a:off x="631932" y="777787"/>
+            <a:ext cx="1346202" cy="1346199"/>
+          </a:xfrm>
+          <a:prstGeom prst="round2SameRect">
+            <a:avLst/>
+          </a:prstGeom>
+          <a:gradFill>
+            <a:gsLst>
+              <a:gs pos="0">
+                <a:srgbClr val="FDFDFD"/>
+              </a:gs>
+              <a:gs pos="100000">
+                <a:srgbClr val="B7B7B8"/>
+              </a:gs>
+            </a:gsLst>
+            <a:lin ang="10800000" scaled="0"/>
+          </a:gradFill>
+          <a:ln w="28575">
+            <a:solidFill>
+              <a:schemeClr val="tx1"/>
+            </a:solidFill>
+          </a:ln>
+          <a:effectLst>
+            <a:outerShdw blurRad="50800" dist="38100" dir="5400000" sx="101000" sy="101000" algn="t" rotWithShape="0">
+              <a:schemeClr val="bg1">
+                <a:alpha val="40000"/>
+              </a:schemeClr>
+            </a:outerShdw>
+          </a:effectLst>
+        </p:spPr>
+        <p:style>
+          <a:lnRef idx="2">
+            <a:schemeClr val="accent1">
+              <a:shade val="50000"/>
+            </a:schemeClr>
+          </a:lnRef>
+          <a:fillRef idx="1">
+            <a:schemeClr val="accent1"/>
+          </a:fillRef>
+          <a:effectRef idx="0">
+            <a:schemeClr val="accent1"/>
+          </a:effectRef>
+          <a:fontRef idx="minor">
+            <a:schemeClr val="lt1"/>
+          </a:fontRef>
+        </p:style>
+        <p:txBody>
+          <a:bodyPr rtlCol="0" anchor="ctr"/>
+          <a:lstStyle/>
+          <a:p>
+            <a:pPr algn="ctr"/>
+            <a:endParaRPr lang="en-US"/>
+          </a:p>
+        </p:txBody>
+      </p:sp>
+      <p:sp>
+        <p:nvSpPr>
+          <p:cNvPr id="13" name="Round Same Side Corner Rectangle 12"/>
+          <p:cNvSpPr/>
+          <p:nvPr/>
+        </p:nvSpPr>
+        <p:spPr>
+          <a:xfrm rot="16200000">
+            <a:off x="7733531" y="702666"/>
+            <a:ext cx="1353376" cy="1351322"/>
+          </a:xfrm>
+          <a:prstGeom prst="round2SameRect">
+            <a:avLst/>
+          </a:prstGeom>
+          <a:gradFill>
+            <a:gsLst>
+              <a:gs pos="0">
+                <a:srgbClr val="91A3B4"/>
+              </a:gs>
+              <a:gs pos="100000">
+                <a:srgbClr val="526D84"/>
+              </a:gs>
+            </a:gsLst>
+            <a:lin ang="10800000" scaled="0"/>
+          </a:gradFill>
+          <a:ln w="28575">
+            <a:solidFill>
+              <a:schemeClr val="tx1"/>
+            </a:solidFill>
+          </a:ln>
+          <a:effectLst>
+            <a:innerShdw blurRad="266700">
+              <a:prstClr val="black"/>
+            </a:innerShdw>
+          </a:effectLst>
+        </p:spPr>
+        <p:style>
+          <a:lnRef idx="2">
+            <a:schemeClr val="accent1">
+              <a:shade val="50000"/>
+            </a:schemeClr>
+          </a:lnRef>
+          <a:fillRef idx="1">
+            <a:schemeClr val="accent1"/>
+          </a:fillRef>
+          <a:effectRef idx="0">
+            <a:schemeClr val="accent1"/>
+          </a:effectRef>
+          <a:fontRef idx="minor">
+            <a:schemeClr val="lt1"/>
+          </a:fontRef>
+        </p:style>
+        <p:txBody>
+          <a:bodyPr rtlCol="0" anchor="ctr"/>
+          <a:lstStyle/>
+          <a:p>
+            <a:pPr algn="ctr"/>
+            <a:endParaRPr lang="en-US"/>
+          </a:p>
+        </p:txBody>
+      </p:sp>
+      <p:sp>
+        <p:nvSpPr>
+          <p:cNvPr id="14" name="Rectangle 13"/>
+          <p:cNvSpPr/>
+          <p:nvPr/>
+        </p:nvSpPr>
+        <p:spPr>
+          <a:xfrm>
+            <a:off x="9080758" y="701638"/>
+            <a:ext cx="1359074" cy="1353377"/>
+          </a:xfrm>
+          <a:prstGeom prst="rect">
+            <a:avLst/>
+          </a:prstGeom>
+          <a:gradFill>
+            <a:gsLst>
+              <a:gs pos="0">
+                <a:srgbClr val="91A3B4"/>
+              </a:gs>
+              <a:gs pos="100000">
+                <a:srgbClr val="526D84"/>
+              </a:gs>
+            </a:gsLst>
+            <a:lin ang="5400000" scaled="1"/>
+          </a:gradFill>
+          <a:ln w="28575">
+            <a:solidFill>
+              <a:schemeClr val="tx1"/>
+            </a:solidFill>
+          </a:ln>
+          <a:effectLst>
+            <a:innerShdw blurRad="266700">
+              <a:prstClr val="black"/>
+            </a:innerShdw>
+          </a:effectLst>
+        </p:spPr>
+        <p:style>
+          <a:lnRef idx="2">
+            <a:schemeClr val="accent1">
+              <a:shade val="50000"/>
+            </a:schemeClr>
+          </a:lnRef>
+          <a:fillRef idx="1">
+            <a:schemeClr val="accent1"/>
+          </a:fillRef>
+          <a:effectRef idx="0">
+            <a:schemeClr val="accent1"/>
+          </a:effectRef>
+          <a:fontRef idx="minor">
+            <a:schemeClr val="lt1"/>
+          </a:fontRef>
+        </p:style>
+        <p:txBody>
+          <a:bodyPr rtlCol="0" anchor="ctr"/>
+          <a:lstStyle/>
+          <a:p>
+            <a:pPr algn="ctr"/>
+            <a:endParaRPr lang="en-US"/>
+          </a:p>
+        </p:txBody>
+      </p:sp>
+      <p:sp>
+        <p:nvSpPr>
+          <p:cNvPr id="15" name="Round Same Side Corner Rectangle 14"/>
+          <p:cNvSpPr/>
+          <p:nvPr/>
+        </p:nvSpPr>
+        <p:spPr>
+          <a:xfrm rot="5400000">
+            <a:off x="10438804" y="702665"/>
+            <a:ext cx="1353378" cy="1351322"/>
+          </a:xfrm>
+          <a:prstGeom prst="round2SameRect">
+            <a:avLst/>
+          </a:prstGeom>
+          <a:gradFill>
+            <a:gsLst>
+              <a:gs pos="0">
+                <a:srgbClr val="91A3B4"/>
+              </a:gs>
+              <a:gs pos="100000">
+                <a:srgbClr val="526D84"/>
+              </a:gs>
+            </a:gsLst>
+            <a:lin ang="0" scaled="0"/>
+          </a:gradFill>
+          <a:ln w="28575">
+            <a:solidFill>
+              <a:schemeClr val="tx1"/>
+            </a:solidFill>
+          </a:ln>
+          <a:effectLst>
+            <a:innerShdw blurRad="266700">
+              <a:prstClr val="black"/>
+            </a:innerShdw>
+          </a:effectLst>
+        </p:spPr>
+        <p:style>
+          <a:lnRef idx="2">
+            <a:schemeClr val="accent1">
+              <a:shade val="50000"/>
+            </a:schemeClr>
+          </a:lnRef>
+          <a:fillRef idx="1">
+            <a:schemeClr val="accent1"/>
+          </a:fillRef>
+          <a:effectRef idx="0">
+            <a:schemeClr val="accent1"/>
+          </a:effectRef>
+          <a:fontRef idx="minor">
+            <a:schemeClr val="lt1"/>
+          </a:fontRef>
+        </p:style>
+        <p:txBody>
+          <a:bodyPr rtlCol="0" anchor="ctr"/>
+          <a:lstStyle/>
+          <a:p>
+            <a:pPr algn="ctr"/>
+            <a:endParaRPr lang="en-US"/>
+          </a:p>
+        </p:txBody>
+      </p:sp>
+      <p:sp>
+        <p:nvSpPr>
+          <p:cNvPr id="16" name="Rectangle 15"/>
+          <p:cNvSpPr/>
+          <p:nvPr/>
+        </p:nvSpPr>
+        <p:spPr>
+          <a:xfrm>
+            <a:off x="0" y="4699000"/>
+            <a:ext cx="12192000" cy="2159000"/>
+          </a:xfrm>
+          <a:prstGeom prst="rect">
+            <a:avLst/>
+          </a:prstGeom>
+          <a:solidFill>
+            <a:schemeClr val="bg1">
+              <a:lumMod val="75000"/>
+            </a:schemeClr>
+          </a:solidFill>
+        </p:spPr>
+        <p:style>
+          <a:lnRef idx="2">
+            <a:schemeClr val="accent1">
+              <a:shade val="50000"/>
+            </a:schemeClr>
+          </a:lnRef>
+          <a:fillRef idx="1">
+            <a:schemeClr val="accent1"/>
+          </a:fillRef>
+          <a:effectRef idx="0">
+            <a:schemeClr val="accent1"/>
+          </a:effectRef>
+          <a:fontRef idx="minor">
+            <a:schemeClr val="lt1"/>
+          </a:fontRef>
+        </p:style>
+        <p:txBody>
+          <a:bodyPr rtlCol="0" anchor="ctr"/>
+          <a:lstStyle/>
+          <a:p>
+            <a:pPr algn="ctr"/>
+            <a:endParaRPr lang="en-US"/>
+          </a:p>
+        </p:txBody>
+      </p:sp>
+      <p:sp>
+        <p:nvSpPr>
+          <p:cNvPr id="19" name="Rectangle 18"/>
+          <p:cNvSpPr/>
+          <p:nvPr/>
+        </p:nvSpPr>
+        <p:spPr>
+          <a:xfrm>
+            <a:off x="2402201" y="2940023"/>
+            <a:ext cx="1346200" cy="1348284"/>
+          </a:xfrm>
+          <a:prstGeom prst="rect">
+            <a:avLst/>
+          </a:prstGeom>
+          <a:gradFill>
+            <a:gsLst>
+              <a:gs pos="0">
+                <a:srgbClr val="FDFDFD"/>
+              </a:gs>
+              <a:gs pos="100000">
+                <a:srgbClr val="B7B7B8"/>
+              </a:gs>
+            </a:gsLst>
+            <a:lin ang="5400000" scaled="1"/>
+          </a:gradFill>
+          <a:ln w="28575">
+            <a:solidFill>
+              <a:schemeClr val="tx1"/>
+            </a:solidFill>
+          </a:ln>
+          <a:effectLst>
+            <a:outerShdw blurRad="50800" dist="38100" dir="5400000" sx="101000" sy="101000" algn="t" rotWithShape="0">
+              <a:schemeClr val="bg1">
+                <a:alpha val="40000"/>
+              </a:schemeClr>
+            </a:outerShdw>
+          </a:effectLst>
+        </p:spPr>
+        <p:style>
+          <a:lnRef idx="2">
+            <a:schemeClr val="accent1">
+              <a:shade val="50000"/>
+            </a:schemeClr>
+          </a:lnRef>
+          <a:fillRef idx="1">
+            <a:schemeClr val="accent1"/>
+          </a:fillRef>
+          <a:effectRef idx="0">
+            <a:schemeClr val="accent1"/>
+          </a:effectRef>
+          <a:fontRef idx="minor">
+            <a:schemeClr val="lt1"/>
+          </a:fontRef>
+        </p:style>
+        <p:txBody>
+          <a:bodyPr rtlCol="0" anchor="ctr"/>
+          <a:lstStyle/>
+          <a:p>
+            <a:pPr algn="ctr"/>
+            <a:endParaRPr lang="en-US"/>
+          </a:p>
+        </p:txBody>
+      </p:sp>
+      <p:sp>
+        <p:nvSpPr>
+          <p:cNvPr id="20" name="Round Same Side Corner Rectangle 19"/>
+          <p:cNvSpPr/>
+          <p:nvPr/>
+        </p:nvSpPr>
+        <p:spPr>
+          <a:xfrm rot="5400000">
+            <a:off x="4428210" y="2938505"/>
+            <a:ext cx="1348285" cy="1351322"/>
+          </a:xfrm>
+          <a:prstGeom prst="round2SameRect">
+            <a:avLst/>
+          </a:prstGeom>
+          <a:gradFill>
+            <a:gsLst>
+              <a:gs pos="0">
+                <a:srgbClr val="FDFDFD"/>
+              </a:gs>
+              <a:gs pos="100000">
+                <a:srgbClr val="B7B7B8"/>
+              </a:gs>
+            </a:gsLst>
+            <a:lin ang="0" scaled="0"/>
+          </a:gradFill>
+          <a:ln w="28575">
+            <a:solidFill>
+              <a:schemeClr val="tx1"/>
+            </a:solidFill>
+          </a:ln>
+          <a:effectLst>
+            <a:outerShdw blurRad="50800" dist="38100" dir="2700000" sx="101000" sy="101000" algn="tl" rotWithShape="0">
+              <a:schemeClr val="bg1">
+                <a:alpha val="40000"/>
+              </a:schemeClr>
+            </a:outerShdw>
+          </a:effectLst>
+        </p:spPr>
+        <p:style>
+          <a:lnRef idx="2">
+            <a:schemeClr val="accent1">
+              <a:shade val="50000"/>
+            </a:schemeClr>
+          </a:lnRef>
+          <a:fillRef idx="1">
+            <a:schemeClr val="accent1"/>
+          </a:fillRef>
+          <a:effectRef idx="0">
+            <a:schemeClr val="accent1"/>
+          </a:effectRef>
+          <a:fontRef idx="minor">
+            <a:schemeClr val="lt1"/>
+          </a:fontRef>
+        </p:style>
+        <p:txBody>
+          <a:bodyPr rtlCol="0" anchor="ctr"/>
+          <a:lstStyle/>
+          <a:p>
+            <a:pPr algn="ctr"/>
+            <a:endParaRPr lang="en-US"/>
+          </a:p>
+        </p:txBody>
+      </p:sp>
+      <p:sp>
+        <p:nvSpPr>
+          <p:cNvPr id="21" name="Round Same Side Corner Rectangle 20"/>
+          <p:cNvSpPr/>
+          <p:nvPr/>
+        </p:nvSpPr>
+        <p:spPr>
+          <a:xfrm rot="16200000">
+            <a:off x="6451781" y="2937373"/>
+            <a:ext cx="1353376" cy="1351322"/>
+          </a:xfrm>
+          <a:prstGeom prst="round2SameRect">
+            <a:avLst/>
+          </a:prstGeom>
+          <a:gradFill>
+            <a:gsLst>
+              <a:gs pos="0">
+                <a:srgbClr val="91A3B4"/>
+              </a:gs>
+              <a:gs pos="100000">
+                <a:srgbClr val="526D84"/>
+              </a:gs>
+            </a:gsLst>
+            <a:lin ang="10800000" scaled="0"/>
+          </a:gradFill>
+          <a:ln w="28575">
+            <a:solidFill>
+              <a:schemeClr val="tx1"/>
+            </a:solidFill>
+          </a:ln>
+          <a:effectLst>
+            <a:outerShdw blurRad="50800" dist="38100" dir="5400000" sx="101000" sy="101000" algn="t" rotWithShape="0">
+              <a:schemeClr val="bg1">
+                <a:alpha val="40000"/>
+              </a:schemeClr>
+            </a:outerShdw>
+          </a:effectLst>
+        </p:spPr>
+        <p:style>
+          <a:lnRef idx="2">
+            <a:schemeClr val="accent1">
+              <a:shade val="50000"/>
+            </a:schemeClr>
+          </a:lnRef>
+          <a:fillRef idx="1">
+            <a:schemeClr val="accent1"/>
+          </a:fillRef>
+          <a:effectRef idx="0">
+            <a:schemeClr val="accent1"/>
+          </a:effectRef>
+          <a:fontRef idx="minor">
+            <a:schemeClr val="lt1"/>
+          </a:fontRef>
+        </p:style>
+        <p:txBody>
+          <a:bodyPr rtlCol="0" anchor="ctr"/>
+          <a:lstStyle/>
+          <a:p>
+            <a:pPr algn="ctr"/>
+            <a:endParaRPr lang="en-US"/>
+          </a:p>
+        </p:txBody>
+      </p:sp>
+      <p:sp>
+        <p:nvSpPr>
+          <p:cNvPr id="22" name="Rectangle 21"/>
+          <p:cNvSpPr/>
+          <p:nvPr/>
+        </p:nvSpPr>
+        <p:spPr>
+          <a:xfrm>
+            <a:off x="8478924" y="2943519"/>
+            <a:ext cx="1359074" cy="1353377"/>
+          </a:xfrm>
+          <a:prstGeom prst="rect">
+            <a:avLst/>
+          </a:prstGeom>
+          <a:gradFill>
+            <a:gsLst>
+              <a:gs pos="0">
+                <a:srgbClr val="91A3B4"/>
+              </a:gs>
+              <a:gs pos="100000">
+                <a:srgbClr val="526D84"/>
+              </a:gs>
+            </a:gsLst>
+            <a:lin ang="5400000" scaled="1"/>
+          </a:gradFill>
+          <a:ln w="28575">
+            <a:solidFill>
+              <a:schemeClr val="tx1"/>
+            </a:solidFill>
+          </a:ln>
+          <a:effectLst>
+            <a:outerShdw blurRad="50800" dist="38100" dir="5400000" sx="101000" sy="101000" algn="t" rotWithShape="0">
+              <a:schemeClr val="bg1">
+                <a:alpha val="40000"/>
+              </a:schemeClr>
+            </a:outerShdw>
+          </a:effectLst>
+        </p:spPr>
+        <p:style>
+          <a:lnRef idx="2">
+            <a:schemeClr val="accent1">
+              <a:shade val="50000"/>
+            </a:schemeClr>
+          </a:lnRef>
+          <a:fillRef idx="1">
+            <a:schemeClr val="accent1"/>
+          </a:fillRef>
+          <a:effectRef idx="0">
+            <a:schemeClr val="accent1"/>
+          </a:effectRef>
+          <a:fontRef idx="minor">
+            <a:schemeClr val="lt1"/>
+          </a:fontRef>
+        </p:style>
+        <p:txBody>
+          <a:bodyPr rtlCol="0" anchor="ctr"/>
+          <a:lstStyle/>
+          <a:p>
+            <a:pPr algn="ctr"/>
+            <a:endParaRPr lang="en-US"/>
+          </a:p>
+        </p:txBody>
+      </p:sp>
+      <p:sp>
+        <p:nvSpPr>
+          <p:cNvPr id="23" name="Round Same Side Corner Rectangle 22"/>
+          <p:cNvSpPr/>
+          <p:nvPr/>
+        </p:nvSpPr>
+        <p:spPr>
+          <a:xfrm rot="5400000">
+            <a:off x="10513730" y="2944547"/>
+            <a:ext cx="1353378" cy="1351322"/>
+          </a:xfrm>
+          <a:prstGeom prst="round2SameRect">
+            <a:avLst/>
+          </a:prstGeom>
+          <a:gradFill>
+            <a:gsLst>
+              <a:gs pos="0">
+                <a:srgbClr val="91A3B4"/>
+              </a:gs>
+              <a:gs pos="100000">
+                <a:srgbClr val="526D84"/>
+              </a:gs>
+            </a:gsLst>
+            <a:lin ang="0" scaled="0"/>
+          </a:gradFill>
+          <a:ln w="28575">
+            <a:solidFill>
+              <a:schemeClr val="tx1"/>
+            </a:solidFill>
+          </a:ln>
+          <a:effectLst>
+            <a:outerShdw blurRad="50800" dist="38100" dir="2700000" sx="101000" sy="101000" algn="tl" rotWithShape="0">
+              <a:schemeClr val="bg1">
+                <a:alpha val="40000"/>
+              </a:schemeClr>
+            </a:outerShdw>
+          </a:effectLst>
+        </p:spPr>
+        <p:style>
+          <a:lnRef idx="2">
+            <a:schemeClr val="accent1">
+              <a:shade val="50000"/>
+            </a:schemeClr>
+          </a:lnRef>
+          <a:fillRef idx="1">
+            <a:schemeClr val="accent1"/>
+          </a:fillRef>
+          <a:effectRef idx="0">
+            <a:schemeClr val="accent1"/>
+          </a:effectRef>
+          <a:fontRef idx="minor">
+            <a:schemeClr val="lt1"/>
+          </a:fontRef>
+        </p:style>
+        <p:txBody>
+          <a:bodyPr rtlCol="0" anchor="ctr"/>
+          <a:lstStyle/>
+          <a:p>
+            <a:pPr algn="ctr"/>
+            <a:endParaRPr lang="en-US"/>
+          </a:p>
+        </p:txBody>
+      </p:sp>
+      <p:sp>
+        <p:nvSpPr>
+          <p:cNvPr id="24" name="Round Same Side Corner Rectangle 23"/>
+          <p:cNvSpPr/>
+          <p:nvPr/>
+        </p:nvSpPr>
+        <p:spPr>
+          <a:xfrm rot="16200000">
+            <a:off x="375148" y="2942106"/>
+            <a:ext cx="1346202" cy="1346199"/>
+          </a:xfrm>
+          <a:prstGeom prst="round2SameRect">
+            <a:avLst/>
+          </a:prstGeom>
+          <a:gradFill>
+            <a:gsLst>
+              <a:gs pos="0">
+                <a:srgbClr val="FDFDFD"/>
+              </a:gs>
+              <a:gs pos="100000">
+                <a:srgbClr val="B7B7B8"/>
+              </a:gs>
+            </a:gsLst>
+            <a:lin ang="10800000" scaled="0"/>
+          </a:gradFill>
+          <a:ln w="28575">
+            <a:solidFill>
+              <a:schemeClr val="tx1"/>
+            </a:solidFill>
+          </a:ln>
+          <a:effectLst>
+            <a:outerShdw blurRad="50800" dist="38100" dir="5400000" sx="101000" sy="101000" algn="t" rotWithShape="0">
+              <a:schemeClr val="bg1">
+                <a:alpha val="40000"/>
+              </a:schemeClr>
+            </a:outerShdw>
+          </a:effectLst>
+        </p:spPr>
+        <p:style>
+          <a:lnRef idx="2">
+            <a:schemeClr val="accent1">
+              <a:shade val="50000"/>
+            </a:schemeClr>
+          </a:lnRef>
+          <a:fillRef idx="1">
+            <a:schemeClr val="accent1"/>
+          </a:fillRef>
+          <a:effectRef idx="0">
+            <a:schemeClr val="accent1"/>
+          </a:effectRef>
+          <a:fontRef idx="minor">
+            <a:schemeClr val="lt1"/>
+          </a:fontRef>
+        </p:style>
+        <p:txBody>
+          <a:bodyPr rtlCol="0" anchor="ctr"/>
+          <a:lstStyle/>
+          <a:p>
+            <a:pPr algn="ctr"/>
+            <a:endParaRPr lang="en-US"/>
+          </a:p>
+        </p:txBody>
+      </p:sp>
+      <p:sp>
+        <p:nvSpPr>
+          <p:cNvPr id="25" name="Round Same Side Corner Rectangle 24"/>
+          <p:cNvSpPr/>
+          <p:nvPr/>
+        </p:nvSpPr>
+        <p:spPr>
+          <a:xfrm rot="16200000">
+            <a:off x="6451781" y="2935958"/>
+            <a:ext cx="1353376" cy="1351322"/>
+          </a:xfrm>
+          <a:prstGeom prst="round2SameRect">
+            <a:avLst/>
+          </a:prstGeom>
+          <a:gradFill>
+            <a:gsLst>
+              <a:gs pos="0">
+                <a:srgbClr val="91A3B4"/>
+              </a:gs>
+              <a:gs pos="100000">
+                <a:srgbClr val="526D84"/>
+              </a:gs>
+            </a:gsLst>
+            <a:lin ang="10800000" scaled="0"/>
+          </a:gradFill>
+          <a:ln w="28575">
+            <a:solidFill>
+              <a:schemeClr val="tx1"/>
+            </a:solidFill>
+          </a:ln>
+          <a:effectLst>
+            <a:innerShdw blurRad="266700">
+              <a:prstClr val="black"/>
+            </a:innerShdw>
+          </a:effectLst>
+        </p:spPr>
+        <p:style>
+          <a:lnRef idx="2">
+            <a:schemeClr val="accent1">
+              <a:shade val="50000"/>
+            </a:schemeClr>
+          </a:lnRef>
+          <a:fillRef idx="1">
+            <a:schemeClr val="accent1"/>
+          </a:fillRef>
+          <a:effectRef idx="0">
+            <a:schemeClr val="accent1"/>
+          </a:effectRef>
+          <a:fontRef idx="minor">
+            <a:schemeClr val="lt1"/>
+          </a:fontRef>
+        </p:style>
+        <p:txBody>
+          <a:bodyPr rtlCol="0" anchor="ctr"/>
+          <a:lstStyle/>
+          <a:p>
+            <a:pPr algn="ctr"/>
+            <a:endParaRPr lang="en-US"/>
+          </a:p>
+        </p:txBody>
+      </p:sp>
+      <p:sp>
+        <p:nvSpPr>
+          <p:cNvPr id="26" name="Rectangle 25"/>
+          <p:cNvSpPr/>
+          <p:nvPr/>
+        </p:nvSpPr>
+        <p:spPr>
+          <a:xfrm>
+            <a:off x="8478924" y="2942104"/>
+            <a:ext cx="1359074" cy="1353377"/>
+          </a:xfrm>
+          <a:prstGeom prst="rect">
+            <a:avLst/>
+          </a:prstGeom>
+          <a:gradFill>
+            <a:gsLst>
+              <a:gs pos="0">
+                <a:srgbClr val="91A3B4"/>
+              </a:gs>
+              <a:gs pos="100000">
+                <a:srgbClr val="526D84"/>
+              </a:gs>
+            </a:gsLst>
+            <a:lin ang="5400000" scaled="1"/>
+          </a:gradFill>
+          <a:ln w="28575">
+            <a:solidFill>
+              <a:schemeClr val="tx1"/>
+            </a:solidFill>
+          </a:ln>
+          <a:effectLst>
+            <a:innerShdw blurRad="266700">
+              <a:prstClr val="black"/>
+            </a:innerShdw>
+          </a:effectLst>
+        </p:spPr>
+        <p:style>
+          <a:lnRef idx="2">
+            <a:schemeClr val="accent1">
+              <a:shade val="50000"/>
+            </a:schemeClr>
+          </a:lnRef>
+          <a:fillRef idx="1">
+            <a:schemeClr val="accent1"/>
+          </a:fillRef>
+          <a:effectRef idx="0">
+            <a:schemeClr val="accent1"/>
+          </a:effectRef>
+          <a:fontRef idx="minor">
+            <a:schemeClr val="lt1"/>
+          </a:fontRef>
+        </p:style>
+        <p:txBody>
+          <a:bodyPr rtlCol="0" anchor="ctr"/>
+          <a:lstStyle/>
+          <a:p>
+            <a:pPr algn="ctr"/>
+            <a:endParaRPr lang="en-US"/>
+          </a:p>
+        </p:txBody>
+      </p:sp>
+      <p:sp>
+        <p:nvSpPr>
+          <p:cNvPr id="27" name="Round Same Side Corner Rectangle 26"/>
+          <p:cNvSpPr/>
+          <p:nvPr/>
+        </p:nvSpPr>
+        <p:spPr>
+          <a:xfrm rot="5400000">
+            <a:off x="10513730" y="2943132"/>
+            <a:ext cx="1353378" cy="1351322"/>
+          </a:xfrm>
+          <a:prstGeom prst="round2SameRect">
+            <a:avLst/>
+          </a:prstGeom>
+          <a:gradFill>
+            <a:gsLst>
+              <a:gs pos="0">
+                <a:srgbClr val="91A3B4"/>
+              </a:gs>
+              <a:gs pos="100000">
+                <a:srgbClr val="526D84"/>
+              </a:gs>
+            </a:gsLst>
+            <a:lin ang="0" scaled="0"/>
+          </a:gradFill>
+          <a:ln w="28575">
+            <a:solidFill>
+              <a:schemeClr val="tx1"/>
+            </a:solidFill>
+          </a:ln>
+          <a:effectLst>
+            <a:innerShdw blurRad="266700">
+              <a:prstClr val="black"/>
+            </a:innerShdw>
+          </a:effectLst>
+        </p:spPr>
+        <p:style>
+          <a:lnRef idx="2">
+            <a:schemeClr val="accent1">
+              <a:shade val="50000"/>
+            </a:schemeClr>
+          </a:lnRef>
+          <a:fillRef idx="1">
+            <a:schemeClr val="accent1"/>
+          </a:fillRef>
+          <a:effectRef idx="0">
+            <a:schemeClr val="accent1"/>
+          </a:effectRef>
+          <a:fontRef idx="minor">
+            <a:schemeClr val="lt1"/>
+          </a:fontRef>
+        </p:style>
+        <p:txBody>
+          <a:bodyPr rtlCol="0" anchor="ctr"/>
+          <a:lstStyle/>
+          <a:p>
+            <a:pPr algn="ctr"/>
+            <a:endParaRPr lang="en-US"/>
+          </a:p>
+        </p:txBody>
+      </p:sp>
+    </p:spTree>
+    <p:extLst>
+      <p:ext uri="{BB962C8B-B14F-4D97-AF65-F5344CB8AC3E}">
+        <p14:creationId xmlns:p14="http://schemas.microsoft.com/office/powerpoint/2010/main" val="978871431"/>
+      </p:ext>
+    </p:extLst>
+  </p:cSld>
+  <p:clrMapOvr>
+    <a:masterClrMapping/>
+  </p:clrMapOvr>
 </p:sld>
 </file>
 

</xml_diff>

<commit_message>
Does not compile. In the middle of reworking Shaders.
</commit_message>
<xml_diff>
--- a/Docs/Gui.pptx
+++ b/Docs/Gui.pptx
@@ -244,7 +244,7 @@
           <a:p>
             <a:fld id="{47491EC4-C74A-4DCB-BF28-C0A7248C12D2}" type="datetimeFigureOut">
               <a:rPr lang="en-US" smtClean="0"/>
-              <a:t>12/18/2013</a:t>
+              <a:t>12/19/2013</a:t>
             </a:fld>
             <a:endParaRPr lang="en-US"/>
           </a:p>
@@ -414,7 +414,7 @@
           <a:p>
             <a:fld id="{47491EC4-C74A-4DCB-BF28-C0A7248C12D2}" type="datetimeFigureOut">
               <a:rPr lang="en-US" smtClean="0"/>
-              <a:t>12/18/2013</a:t>
+              <a:t>12/19/2013</a:t>
             </a:fld>
             <a:endParaRPr lang="en-US"/>
           </a:p>
@@ -594,7 +594,7 @@
           <a:p>
             <a:fld id="{47491EC4-C74A-4DCB-BF28-C0A7248C12D2}" type="datetimeFigureOut">
               <a:rPr lang="en-US" smtClean="0"/>
-              <a:t>12/18/2013</a:t>
+              <a:t>12/19/2013</a:t>
             </a:fld>
             <a:endParaRPr lang="en-US"/>
           </a:p>
@@ -764,7 +764,7 @@
           <a:p>
             <a:fld id="{47491EC4-C74A-4DCB-BF28-C0A7248C12D2}" type="datetimeFigureOut">
               <a:rPr lang="en-US" smtClean="0"/>
-              <a:t>12/18/2013</a:t>
+              <a:t>12/19/2013</a:t>
             </a:fld>
             <a:endParaRPr lang="en-US"/>
           </a:p>
@@ -1010,7 +1010,7 @@
           <a:p>
             <a:fld id="{47491EC4-C74A-4DCB-BF28-C0A7248C12D2}" type="datetimeFigureOut">
               <a:rPr lang="en-US" smtClean="0"/>
-              <a:t>12/18/2013</a:t>
+              <a:t>12/19/2013</a:t>
             </a:fld>
             <a:endParaRPr lang="en-US"/>
           </a:p>
@@ -1242,7 +1242,7 @@
           <a:p>
             <a:fld id="{47491EC4-C74A-4DCB-BF28-C0A7248C12D2}" type="datetimeFigureOut">
               <a:rPr lang="en-US" smtClean="0"/>
-              <a:t>12/18/2013</a:t>
+              <a:t>12/19/2013</a:t>
             </a:fld>
             <a:endParaRPr lang="en-US"/>
           </a:p>
@@ -1609,7 +1609,7 @@
           <a:p>
             <a:fld id="{47491EC4-C74A-4DCB-BF28-C0A7248C12D2}" type="datetimeFigureOut">
               <a:rPr lang="en-US" smtClean="0"/>
-              <a:t>12/18/2013</a:t>
+              <a:t>12/19/2013</a:t>
             </a:fld>
             <a:endParaRPr lang="en-US"/>
           </a:p>
@@ -1727,7 +1727,7 @@
           <a:p>
             <a:fld id="{47491EC4-C74A-4DCB-BF28-C0A7248C12D2}" type="datetimeFigureOut">
               <a:rPr lang="en-US" smtClean="0"/>
-              <a:t>12/18/2013</a:t>
+              <a:t>12/19/2013</a:t>
             </a:fld>
             <a:endParaRPr lang="en-US"/>
           </a:p>
@@ -1822,7 +1822,7 @@
           <a:p>
             <a:fld id="{47491EC4-C74A-4DCB-BF28-C0A7248C12D2}" type="datetimeFigureOut">
               <a:rPr lang="en-US" smtClean="0"/>
-              <a:t>12/18/2013</a:t>
+              <a:t>12/19/2013</a:t>
             </a:fld>
             <a:endParaRPr lang="en-US"/>
           </a:p>
@@ -2099,7 +2099,7 @@
           <a:p>
             <a:fld id="{47491EC4-C74A-4DCB-BF28-C0A7248C12D2}" type="datetimeFigureOut">
               <a:rPr lang="en-US" smtClean="0"/>
-              <a:t>12/18/2013</a:t>
+              <a:t>12/19/2013</a:t>
             </a:fld>
             <a:endParaRPr lang="en-US"/>
           </a:p>
@@ -2352,7 +2352,7 @@
           <a:p>
             <a:fld id="{47491EC4-C74A-4DCB-BF28-C0A7248C12D2}" type="datetimeFigureOut">
               <a:rPr lang="en-US" smtClean="0"/>
-              <a:t>12/18/2013</a:t>
+              <a:t>12/19/2013</a:t>
             </a:fld>
             <a:endParaRPr lang="en-US"/>
           </a:p>
@@ -2565,7 +2565,7 @@
           <a:p>
             <a:fld id="{47491EC4-C74A-4DCB-BF28-C0A7248C12D2}" type="datetimeFigureOut">
               <a:rPr lang="en-US" smtClean="0"/>
-              <a:t>12/18/2013</a:t>
+              <a:t>12/19/2013</a:t>
             </a:fld>
             <a:endParaRPr lang="en-US"/>
           </a:p>
@@ -4176,55 +4176,6 @@
       </p:sp>
       <p:sp>
         <p:nvSpPr>
-          <p:cNvPr id="25" name="Rounded Rectangle 24"/>
-          <p:cNvSpPr/>
-          <p:nvPr/>
-        </p:nvSpPr>
-        <p:spPr>
-          <a:xfrm>
-            <a:off x="2020814" y="5049254"/>
-            <a:ext cx="1346200" cy="1346200"/>
-          </a:xfrm>
-          <a:prstGeom prst="roundRect">
-            <a:avLst>
-              <a:gd name="adj" fmla="val 16667"/>
-            </a:avLst>
-          </a:prstGeom>
-          <a:solidFill>
-            <a:schemeClr val="bg1"/>
-          </a:solidFill>
-          <a:ln w="28575">
-            <a:noFill/>
-          </a:ln>
-          <a:effectLst/>
-        </p:spPr>
-        <p:style>
-          <a:lnRef idx="2">
-            <a:schemeClr val="accent1">
-              <a:shade val="50000"/>
-            </a:schemeClr>
-          </a:lnRef>
-          <a:fillRef idx="1">
-            <a:schemeClr val="accent1"/>
-          </a:fillRef>
-          <a:effectRef idx="0">
-            <a:schemeClr val="accent1"/>
-          </a:effectRef>
-          <a:fontRef idx="minor">
-            <a:schemeClr val="lt1"/>
-          </a:fontRef>
-        </p:style>
-        <p:txBody>
-          <a:bodyPr rtlCol="0" anchor="ctr"/>
-          <a:lstStyle/>
-          <a:p>
-            <a:pPr algn="ctr"/>
-            <a:endParaRPr lang="en-US"/>
-          </a:p>
-        </p:txBody>
-      </p:sp>
-      <p:sp>
-        <p:nvSpPr>
           <p:cNvPr id="26" name="Rounded Rectangle 25"/>
           <p:cNvSpPr/>
           <p:nvPr/>
@@ -4947,6 +4898,51 @@
       </p:grpSpPr>
       <p:sp>
         <p:nvSpPr>
+          <p:cNvPr id="41" name="Rectangle 40"/>
+          <p:cNvSpPr/>
+          <p:nvPr/>
+        </p:nvSpPr>
+        <p:spPr>
+          <a:xfrm>
+            <a:off x="0" y="4616119"/>
+            <a:ext cx="12192000" cy="2159000"/>
+          </a:xfrm>
+          <a:prstGeom prst="rect">
+            <a:avLst/>
+          </a:prstGeom>
+          <a:solidFill>
+            <a:schemeClr val="bg1">
+              <a:lumMod val="75000"/>
+            </a:schemeClr>
+          </a:solidFill>
+        </p:spPr>
+        <p:style>
+          <a:lnRef idx="2">
+            <a:schemeClr val="accent1">
+              <a:shade val="50000"/>
+            </a:schemeClr>
+          </a:lnRef>
+          <a:fillRef idx="1">
+            <a:schemeClr val="accent1"/>
+          </a:fillRef>
+          <a:effectRef idx="0">
+            <a:schemeClr val="accent1"/>
+          </a:effectRef>
+          <a:fontRef idx="minor">
+            <a:schemeClr val="lt1"/>
+          </a:fontRef>
+        </p:style>
+        <p:txBody>
+          <a:bodyPr rtlCol="0" anchor="ctr"/>
+          <a:lstStyle/>
+          <a:p>
+            <a:pPr algn="ctr"/>
+            <a:endParaRPr lang="en-US"/>
+          </a:p>
+        </p:txBody>
+      </p:sp>
+      <p:sp>
+        <p:nvSpPr>
           <p:cNvPr id="4" name="Rectangle 3"/>
           <p:cNvSpPr/>
           <p:nvPr/>
@@ -5559,7 +5555,7 @@
         </p:nvSpPr>
         <p:spPr>
           <a:xfrm>
-            <a:off x="0" y="4699000"/>
+            <a:off x="0" y="2457119"/>
             <a:ext cx="12192000" cy="2159000"/>
           </a:xfrm>
           <a:prstGeom prst="rect">
@@ -6129,6 +6125,925 @@
           <a:effectLst>
             <a:innerShdw blurRad="266700">
               <a:prstClr val="black"/>
+            </a:innerShdw>
+          </a:effectLst>
+        </p:spPr>
+        <p:style>
+          <a:lnRef idx="2">
+            <a:schemeClr val="accent1">
+              <a:shade val="50000"/>
+            </a:schemeClr>
+          </a:lnRef>
+          <a:fillRef idx="1">
+            <a:schemeClr val="accent1"/>
+          </a:fillRef>
+          <a:effectRef idx="0">
+            <a:schemeClr val="accent1"/>
+          </a:effectRef>
+          <a:fontRef idx="minor">
+            <a:schemeClr val="lt1"/>
+          </a:fontRef>
+        </p:style>
+        <p:txBody>
+          <a:bodyPr rtlCol="0" anchor="ctr"/>
+          <a:lstStyle/>
+          <a:p>
+            <a:pPr algn="ctr"/>
+            <a:endParaRPr lang="en-US"/>
+          </a:p>
+        </p:txBody>
+      </p:sp>
+      <p:sp>
+        <p:nvSpPr>
+          <p:cNvPr id="28" name="Rounded Rectangle 27"/>
+          <p:cNvSpPr/>
+          <p:nvPr/>
+        </p:nvSpPr>
+        <p:spPr>
+          <a:xfrm>
+            <a:off x="431485" y="5176692"/>
+            <a:ext cx="1346200" cy="1346200"/>
+          </a:xfrm>
+          <a:prstGeom prst="roundRect">
+            <a:avLst>
+              <a:gd name="adj" fmla="val 16667"/>
+            </a:avLst>
+          </a:prstGeom>
+          <a:solidFill>
+            <a:srgbClr val="B7B7B8"/>
+          </a:solidFill>
+          <a:ln w="28575">
+            <a:solidFill>
+              <a:schemeClr val="tx1"/>
+            </a:solidFill>
+          </a:ln>
+          <a:effectLst/>
+        </p:spPr>
+        <p:style>
+          <a:lnRef idx="2">
+            <a:schemeClr val="accent1">
+              <a:shade val="50000"/>
+            </a:schemeClr>
+          </a:lnRef>
+          <a:fillRef idx="1">
+            <a:schemeClr val="accent1"/>
+          </a:fillRef>
+          <a:effectRef idx="0">
+            <a:schemeClr val="accent1"/>
+          </a:effectRef>
+          <a:fontRef idx="minor">
+            <a:schemeClr val="lt1"/>
+          </a:fontRef>
+        </p:style>
+        <p:txBody>
+          <a:bodyPr rtlCol="0" anchor="ctr"/>
+          <a:lstStyle/>
+          <a:p>
+            <a:pPr algn="ctr"/>
+            <a:endParaRPr lang="en-US"/>
+          </a:p>
+        </p:txBody>
+      </p:sp>
+      <p:cxnSp>
+        <p:nvCxnSpPr>
+          <p:cNvPr id="29" name="Straight Connector 28"/>
+          <p:cNvCxnSpPr/>
+          <p:nvPr/>
+        </p:nvCxnSpPr>
+        <p:spPr>
+          <a:xfrm>
+            <a:off x="431485" y="5498621"/>
+            <a:ext cx="1346200" cy="0"/>
+          </a:xfrm>
+          <a:prstGeom prst="line">
+            <a:avLst/>
+          </a:prstGeom>
+          <a:ln w="28575">
+            <a:solidFill>
+              <a:schemeClr val="tx1"/>
+            </a:solidFill>
+          </a:ln>
+        </p:spPr>
+        <p:style>
+          <a:lnRef idx="1">
+            <a:schemeClr val="accent1"/>
+          </a:lnRef>
+          <a:fillRef idx="0">
+            <a:schemeClr val="accent1"/>
+          </a:fillRef>
+          <a:effectRef idx="0">
+            <a:schemeClr val="accent1"/>
+          </a:effectRef>
+          <a:fontRef idx="minor">
+            <a:schemeClr val="tx1"/>
+          </a:fontRef>
+        </p:style>
+      </p:cxnSp>
+      <p:cxnSp>
+        <p:nvCxnSpPr>
+          <p:cNvPr id="30" name="Straight Connector 29"/>
+          <p:cNvCxnSpPr/>
+          <p:nvPr/>
+        </p:nvCxnSpPr>
+        <p:spPr>
+          <a:xfrm>
+            <a:off x="794277" y="5498621"/>
+            <a:ext cx="0" cy="1024271"/>
+          </a:xfrm>
+          <a:prstGeom prst="line">
+            <a:avLst/>
+          </a:prstGeom>
+          <a:ln w="28575">
+            <a:solidFill>
+              <a:schemeClr val="tx1"/>
+            </a:solidFill>
+          </a:ln>
+        </p:spPr>
+        <p:style>
+          <a:lnRef idx="1">
+            <a:schemeClr val="accent1"/>
+          </a:lnRef>
+          <a:fillRef idx="0">
+            <a:schemeClr val="accent1"/>
+          </a:fillRef>
+          <a:effectRef idx="0">
+            <a:schemeClr val="accent1"/>
+          </a:effectRef>
+          <a:fontRef idx="minor">
+            <a:schemeClr val="tx1"/>
+          </a:fontRef>
+        </p:style>
+      </p:cxnSp>
+      <p:sp>
+        <p:nvSpPr>
+          <p:cNvPr id="31" name="Round Single Corner Rectangle 30"/>
+          <p:cNvSpPr/>
+          <p:nvPr/>
+        </p:nvSpPr>
+        <p:spPr>
+          <a:xfrm rot="5400000" flipV="1">
+            <a:off x="100745" y="5824598"/>
+            <a:ext cx="1024273" cy="362792"/>
+          </a:xfrm>
+          <a:prstGeom prst="round1Rect">
+            <a:avLst>
+              <a:gd name="adj" fmla="val 50000"/>
+            </a:avLst>
+          </a:prstGeom>
+          <a:solidFill>
+            <a:schemeClr val="tx1"/>
+          </a:solidFill>
+          <a:ln>
+            <a:noFill/>
+          </a:ln>
+        </p:spPr>
+        <p:style>
+          <a:lnRef idx="2">
+            <a:schemeClr val="accent1">
+              <a:shade val="50000"/>
+            </a:schemeClr>
+          </a:lnRef>
+          <a:fillRef idx="1">
+            <a:schemeClr val="accent1"/>
+          </a:fillRef>
+          <a:effectRef idx="0">
+            <a:schemeClr val="accent1"/>
+          </a:effectRef>
+          <a:fontRef idx="minor">
+            <a:schemeClr val="lt1"/>
+          </a:fontRef>
+        </p:style>
+        <p:txBody>
+          <a:bodyPr rtlCol="0" anchor="ctr"/>
+          <a:lstStyle/>
+          <a:p>
+            <a:pPr algn="ctr"/>
+            <a:endParaRPr lang="en-US"/>
+          </a:p>
+        </p:txBody>
+      </p:sp>
+      <p:grpSp>
+        <p:nvGrpSpPr>
+          <p:cNvPr id="5" name="Group 4"/>
+          <p:cNvGrpSpPr/>
+          <p:nvPr/>
+        </p:nvGrpSpPr>
+        <p:grpSpPr>
+          <a:xfrm>
+            <a:off x="2450787" y="5177815"/>
+            <a:ext cx="1346200" cy="1346200"/>
+            <a:chOff x="2450787" y="5177815"/>
+            <a:chExt cx="1346200" cy="1346200"/>
+          </a:xfrm>
+          <a:effectLst>
+            <a:outerShdw blurRad="50800" dist="38100" dir="2700000" sx="101000" sy="101000" algn="tl" rotWithShape="0">
+              <a:schemeClr val="bg1">
+                <a:alpha val="40000"/>
+              </a:schemeClr>
+            </a:outerShdw>
+          </a:effectLst>
+        </p:grpSpPr>
+        <p:sp>
+          <p:nvSpPr>
+            <p:cNvPr id="32" name="Rounded Rectangle 31"/>
+            <p:cNvSpPr/>
+            <p:nvPr/>
+          </p:nvSpPr>
+          <p:spPr>
+            <a:xfrm>
+              <a:off x="2450787" y="5177815"/>
+              <a:ext cx="1346200" cy="1346200"/>
+            </a:xfrm>
+            <a:prstGeom prst="roundRect">
+              <a:avLst>
+                <a:gd name="adj" fmla="val 16667"/>
+              </a:avLst>
+            </a:prstGeom>
+            <a:noFill/>
+            <a:ln w="63500">
+              <a:solidFill>
+                <a:schemeClr val="tx1"/>
+              </a:solidFill>
+            </a:ln>
+            <a:effectLst/>
+          </p:spPr>
+          <p:style>
+            <a:lnRef idx="2">
+              <a:schemeClr val="accent1">
+                <a:shade val="50000"/>
+              </a:schemeClr>
+            </a:lnRef>
+            <a:fillRef idx="1">
+              <a:schemeClr val="accent1"/>
+            </a:fillRef>
+            <a:effectRef idx="0">
+              <a:schemeClr val="accent1"/>
+            </a:effectRef>
+            <a:fontRef idx="minor">
+              <a:schemeClr val="lt1"/>
+            </a:fontRef>
+          </p:style>
+          <p:txBody>
+            <a:bodyPr rtlCol="0" anchor="ctr"/>
+            <a:lstStyle/>
+            <a:p>
+              <a:pPr algn="ctr"/>
+              <a:endParaRPr lang="en-US"/>
+            </a:p>
+          </p:txBody>
+        </p:sp>
+        <p:cxnSp>
+          <p:nvCxnSpPr>
+            <p:cNvPr id="33" name="Straight Connector 32"/>
+            <p:cNvCxnSpPr/>
+            <p:nvPr/>
+          </p:nvCxnSpPr>
+          <p:spPr>
+            <a:xfrm>
+              <a:off x="2450787" y="5499744"/>
+              <a:ext cx="1346200" cy="0"/>
+            </a:xfrm>
+            <a:prstGeom prst="line">
+              <a:avLst/>
+            </a:prstGeom>
+            <a:ln w="63500">
+              <a:solidFill>
+                <a:schemeClr val="tx1"/>
+              </a:solidFill>
+            </a:ln>
+          </p:spPr>
+          <p:style>
+            <a:lnRef idx="1">
+              <a:schemeClr val="accent1"/>
+            </a:lnRef>
+            <a:fillRef idx="0">
+              <a:schemeClr val="accent1"/>
+            </a:fillRef>
+            <a:effectRef idx="0">
+              <a:schemeClr val="accent1"/>
+            </a:effectRef>
+            <a:fontRef idx="minor">
+              <a:schemeClr val="tx1"/>
+            </a:fontRef>
+          </p:style>
+        </p:cxnSp>
+        <p:cxnSp>
+          <p:nvCxnSpPr>
+            <p:cNvPr id="34" name="Straight Connector 33"/>
+            <p:cNvCxnSpPr/>
+            <p:nvPr/>
+          </p:nvCxnSpPr>
+          <p:spPr>
+            <a:xfrm>
+              <a:off x="2813579" y="5499744"/>
+              <a:ext cx="0" cy="1024271"/>
+            </a:xfrm>
+            <a:prstGeom prst="line">
+              <a:avLst/>
+            </a:prstGeom>
+            <a:ln w="28575">
+              <a:solidFill>
+                <a:schemeClr val="tx1"/>
+              </a:solidFill>
+            </a:ln>
+          </p:spPr>
+          <p:style>
+            <a:lnRef idx="1">
+              <a:schemeClr val="accent1"/>
+            </a:lnRef>
+            <a:fillRef idx="0">
+              <a:schemeClr val="accent1"/>
+            </a:fillRef>
+            <a:effectRef idx="0">
+              <a:schemeClr val="accent1"/>
+            </a:effectRef>
+            <a:fontRef idx="minor">
+              <a:schemeClr val="tx1"/>
+            </a:fontRef>
+          </p:style>
+        </p:cxnSp>
+        <p:sp>
+          <p:nvSpPr>
+            <p:cNvPr id="35" name="Round Single Corner Rectangle 34"/>
+            <p:cNvSpPr/>
+            <p:nvPr/>
+          </p:nvSpPr>
+          <p:spPr>
+            <a:xfrm rot="5400000" flipV="1">
+              <a:off x="2120047" y="5825721"/>
+              <a:ext cx="1024273" cy="362792"/>
+            </a:xfrm>
+            <a:prstGeom prst="round1Rect">
+              <a:avLst>
+                <a:gd name="adj" fmla="val 50000"/>
+              </a:avLst>
+            </a:prstGeom>
+            <a:solidFill>
+              <a:schemeClr val="tx1"/>
+            </a:solidFill>
+            <a:ln>
+              <a:noFill/>
+            </a:ln>
+          </p:spPr>
+          <p:style>
+            <a:lnRef idx="2">
+              <a:schemeClr val="accent1">
+                <a:shade val="50000"/>
+              </a:schemeClr>
+            </a:lnRef>
+            <a:fillRef idx="1">
+              <a:schemeClr val="accent1"/>
+            </a:fillRef>
+            <a:effectRef idx="0">
+              <a:schemeClr val="accent1"/>
+            </a:effectRef>
+            <a:fontRef idx="minor">
+              <a:schemeClr val="lt1"/>
+            </a:fontRef>
+          </p:style>
+          <p:txBody>
+            <a:bodyPr rtlCol="0" anchor="ctr"/>
+            <a:lstStyle/>
+            <a:p>
+              <a:pPr algn="ctr"/>
+              <a:endParaRPr lang="en-US"/>
+            </a:p>
+          </p:txBody>
+        </p:sp>
+      </p:grpSp>
+      <p:grpSp>
+        <p:nvGrpSpPr>
+          <p:cNvPr id="6" name="Group 5"/>
+          <p:cNvGrpSpPr/>
+          <p:nvPr/>
+        </p:nvGrpSpPr>
+        <p:grpSpPr>
+          <a:xfrm>
+            <a:off x="4159779" y="5177815"/>
+            <a:ext cx="1346200" cy="1346200"/>
+            <a:chOff x="4159779" y="5177815"/>
+            <a:chExt cx="1346200" cy="1346200"/>
+          </a:xfrm>
+          <a:effectLst>
+            <a:outerShdw blurRad="50800" dist="38100" dir="2700000" sx="101000" sy="101000" algn="tl" rotWithShape="0">
+              <a:schemeClr val="bg1">
+                <a:alpha val="40000"/>
+              </a:schemeClr>
+            </a:outerShdw>
+          </a:effectLst>
+        </p:grpSpPr>
+        <p:sp>
+          <p:nvSpPr>
+            <p:cNvPr id="37" name="Rounded Rectangle 36"/>
+            <p:cNvSpPr/>
+            <p:nvPr/>
+          </p:nvSpPr>
+          <p:spPr>
+            <a:xfrm flipH="1">
+              <a:off x="4159779" y="5177815"/>
+              <a:ext cx="1346200" cy="1346200"/>
+            </a:xfrm>
+            <a:prstGeom prst="roundRect">
+              <a:avLst>
+                <a:gd name="adj" fmla="val 16667"/>
+              </a:avLst>
+            </a:prstGeom>
+            <a:noFill/>
+            <a:ln w="63500">
+              <a:solidFill>
+                <a:schemeClr val="tx1"/>
+              </a:solidFill>
+            </a:ln>
+            <a:effectLst/>
+          </p:spPr>
+          <p:style>
+            <a:lnRef idx="2">
+              <a:schemeClr val="accent1">
+                <a:shade val="50000"/>
+              </a:schemeClr>
+            </a:lnRef>
+            <a:fillRef idx="1">
+              <a:schemeClr val="accent1"/>
+            </a:fillRef>
+            <a:effectRef idx="0">
+              <a:schemeClr val="accent1"/>
+            </a:effectRef>
+            <a:fontRef idx="minor">
+              <a:schemeClr val="lt1"/>
+            </a:fontRef>
+          </p:style>
+          <p:txBody>
+            <a:bodyPr rtlCol="0" anchor="ctr"/>
+            <a:lstStyle/>
+            <a:p>
+              <a:pPr algn="ctr"/>
+              <a:endParaRPr lang="en-US"/>
+            </a:p>
+          </p:txBody>
+        </p:sp>
+        <p:cxnSp>
+          <p:nvCxnSpPr>
+            <p:cNvPr id="38" name="Straight Connector 37"/>
+            <p:cNvCxnSpPr/>
+            <p:nvPr/>
+          </p:nvCxnSpPr>
+          <p:spPr>
+            <a:xfrm flipH="1">
+              <a:off x="4159779" y="5499744"/>
+              <a:ext cx="1346200" cy="0"/>
+            </a:xfrm>
+            <a:prstGeom prst="line">
+              <a:avLst/>
+            </a:prstGeom>
+            <a:ln w="63500">
+              <a:solidFill>
+                <a:schemeClr val="tx1"/>
+              </a:solidFill>
+            </a:ln>
+          </p:spPr>
+          <p:style>
+            <a:lnRef idx="1">
+              <a:schemeClr val="accent1"/>
+            </a:lnRef>
+            <a:fillRef idx="0">
+              <a:schemeClr val="accent1"/>
+            </a:fillRef>
+            <a:effectRef idx="0">
+              <a:schemeClr val="accent1"/>
+            </a:effectRef>
+            <a:fontRef idx="minor">
+              <a:schemeClr val="tx1"/>
+            </a:fontRef>
+          </p:style>
+        </p:cxnSp>
+        <p:cxnSp>
+          <p:nvCxnSpPr>
+            <p:cNvPr id="39" name="Straight Connector 38"/>
+            <p:cNvCxnSpPr/>
+            <p:nvPr/>
+          </p:nvCxnSpPr>
+          <p:spPr>
+            <a:xfrm flipH="1">
+              <a:off x="5143187" y="5499744"/>
+              <a:ext cx="0" cy="1024271"/>
+            </a:xfrm>
+            <a:prstGeom prst="line">
+              <a:avLst/>
+            </a:prstGeom>
+            <a:ln w="28575">
+              <a:solidFill>
+                <a:schemeClr val="tx1"/>
+              </a:solidFill>
+            </a:ln>
+          </p:spPr>
+          <p:style>
+            <a:lnRef idx="1">
+              <a:schemeClr val="accent1"/>
+            </a:lnRef>
+            <a:fillRef idx="0">
+              <a:schemeClr val="accent1"/>
+            </a:fillRef>
+            <a:effectRef idx="0">
+              <a:schemeClr val="accent1"/>
+            </a:effectRef>
+            <a:fontRef idx="minor">
+              <a:schemeClr val="tx1"/>
+            </a:fontRef>
+          </p:style>
+        </p:cxnSp>
+        <p:sp>
+          <p:nvSpPr>
+            <p:cNvPr id="40" name="Round Single Corner Rectangle 39"/>
+            <p:cNvSpPr/>
+            <p:nvPr/>
+          </p:nvSpPr>
+          <p:spPr>
+            <a:xfrm rot="16200000" flipH="1" flipV="1">
+              <a:off x="4812446" y="5825721"/>
+              <a:ext cx="1024273" cy="362792"/>
+            </a:xfrm>
+            <a:prstGeom prst="round1Rect">
+              <a:avLst>
+                <a:gd name="adj" fmla="val 50000"/>
+              </a:avLst>
+            </a:prstGeom>
+            <a:solidFill>
+              <a:schemeClr val="tx1"/>
+            </a:solidFill>
+            <a:ln>
+              <a:noFill/>
+            </a:ln>
+          </p:spPr>
+          <p:style>
+            <a:lnRef idx="2">
+              <a:schemeClr val="accent1">
+                <a:shade val="50000"/>
+              </a:schemeClr>
+            </a:lnRef>
+            <a:fillRef idx="1">
+              <a:schemeClr val="accent1"/>
+            </a:fillRef>
+            <a:effectRef idx="0">
+              <a:schemeClr val="accent1"/>
+            </a:effectRef>
+            <a:fontRef idx="minor">
+              <a:schemeClr val="lt1"/>
+            </a:fontRef>
+          </p:style>
+          <p:txBody>
+            <a:bodyPr rtlCol="0" anchor="ctr"/>
+            <a:lstStyle/>
+            <a:p>
+              <a:pPr algn="ctr"/>
+              <a:endParaRPr lang="en-US"/>
+            </a:p>
+          </p:txBody>
+        </p:sp>
+      </p:grpSp>
+      <p:sp>
+        <p:nvSpPr>
+          <p:cNvPr id="42" name="Rectangle 41"/>
+          <p:cNvSpPr/>
+          <p:nvPr/>
+        </p:nvSpPr>
+        <p:spPr>
+          <a:xfrm>
+            <a:off x="8479862" y="5176692"/>
+            <a:ext cx="1346200" cy="1348284"/>
+          </a:xfrm>
+          <a:prstGeom prst="rect">
+            <a:avLst/>
+          </a:prstGeom>
+          <a:gradFill>
+            <a:gsLst>
+              <a:gs pos="0">
+                <a:srgbClr val="FDFDFD"/>
+              </a:gs>
+              <a:gs pos="100000">
+                <a:srgbClr val="B7B7B8"/>
+              </a:gs>
+            </a:gsLst>
+            <a:lin ang="5400000" scaled="1"/>
+          </a:gradFill>
+          <a:ln w="28575">
+            <a:solidFill>
+              <a:schemeClr val="tx1"/>
+            </a:solidFill>
+          </a:ln>
+          <a:effectLst>
+            <a:outerShdw blurRad="50800" dist="38100" dir="5400000" sx="101000" sy="101000" algn="t" rotWithShape="0">
+              <a:schemeClr val="bg1">
+                <a:alpha val="40000"/>
+              </a:schemeClr>
+            </a:outerShdw>
+          </a:effectLst>
+        </p:spPr>
+        <p:style>
+          <a:lnRef idx="2">
+            <a:schemeClr val="accent1">
+              <a:shade val="50000"/>
+            </a:schemeClr>
+          </a:lnRef>
+          <a:fillRef idx="1">
+            <a:schemeClr val="accent1"/>
+          </a:fillRef>
+          <a:effectRef idx="0">
+            <a:schemeClr val="accent1"/>
+          </a:effectRef>
+          <a:fontRef idx="minor">
+            <a:schemeClr val="lt1"/>
+          </a:fontRef>
+        </p:style>
+        <p:txBody>
+          <a:bodyPr rtlCol="0" anchor="ctr"/>
+          <a:lstStyle/>
+          <a:p>
+            <a:pPr algn="ctr"/>
+            <a:endParaRPr lang="en-US"/>
+          </a:p>
+        </p:txBody>
+      </p:sp>
+      <p:sp>
+        <p:nvSpPr>
+          <p:cNvPr id="43" name="Round Same Side Corner Rectangle 42"/>
+          <p:cNvSpPr/>
+          <p:nvPr/>
+        </p:nvSpPr>
+        <p:spPr>
+          <a:xfrm rot="5400000">
+            <a:off x="10505871" y="5175174"/>
+            <a:ext cx="1348285" cy="1351322"/>
+          </a:xfrm>
+          <a:prstGeom prst="round2SameRect">
+            <a:avLst/>
+          </a:prstGeom>
+          <a:gradFill>
+            <a:gsLst>
+              <a:gs pos="0">
+                <a:srgbClr val="FDFDFD"/>
+              </a:gs>
+              <a:gs pos="100000">
+                <a:srgbClr val="B7B7B8"/>
+              </a:gs>
+            </a:gsLst>
+            <a:lin ang="0" scaled="0"/>
+          </a:gradFill>
+          <a:ln w="28575">
+            <a:solidFill>
+              <a:schemeClr val="tx1"/>
+            </a:solidFill>
+          </a:ln>
+          <a:effectLst>
+            <a:outerShdw blurRad="50800" dist="38100" dir="2700000" sx="101000" sy="101000" algn="tl" rotWithShape="0">
+              <a:schemeClr val="bg1">
+                <a:alpha val="40000"/>
+              </a:schemeClr>
+            </a:outerShdw>
+          </a:effectLst>
+        </p:spPr>
+        <p:style>
+          <a:lnRef idx="2">
+            <a:schemeClr val="accent1">
+              <a:shade val="50000"/>
+            </a:schemeClr>
+          </a:lnRef>
+          <a:fillRef idx="1">
+            <a:schemeClr val="accent1"/>
+          </a:fillRef>
+          <a:effectRef idx="0">
+            <a:schemeClr val="accent1"/>
+          </a:effectRef>
+          <a:fontRef idx="minor">
+            <a:schemeClr val="lt1"/>
+          </a:fontRef>
+        </p:style>
+        <p:txBody>
+          <a:bodyPr rtlCol="0" anchor="ctr"/>
+          <a:lstStyle/>
+          <a:p>
+            <a:pPr algn="ctr"/>
+            <a:endParaRPr lang="en-US"/>
+          </a:p>
+        </p:txBody>
+      </p:sp>
+      <p:sp>
+        <p:nvSpPr>
+          <p:cNvPr id="44" name="Round Same Side Corner Rectangle 43"/>
+          <p:cNvSpPr/>
+          <p:nvPr/>
+        </p:nvSpPr>
+        <p:spPr>
+          <a:xfrm rot="16200000">
+            <a:off x="6452809" y="5178775"/>
+            <a:ext cx="1346202" cy="1346199"/>
+          </a:xfrm>
+          <a:prstGeom prst="round2SameRect">
+            <a:avLst/>
+          </a:prstGeom>
+          <a:gradFill>
+            <a:gsLst>
+              <a:gs pos="0">
+                <a:srgbClr val="FDFDFD"/>
+              </a:gs>
+              <a:gs pos="100000">
+                <a:srgbClr val="B7B7B8"/>
+              </a:gs>
+            </a:gsLst>
+            <a:lin ang="10800000" scaled="0"/>
+          </a:gradFill>
+          <a:ln w="28575">
+            <a:solidFill>
+              <a:schemeClr val="tx1"/>
+            </a:solidFill>
+          </a:ln>
+          <a:effectLst>
+            <a:outerShdw blurRad="50800" dist="38100" dir="5400000" sx="101000" sy="101000" algn="t" rotWithShape="0">
+              <a:schemeClr val="bg1">
+                <a:alpha val="40000"/>
+              </a:schemeClr>
+            </a:outerShdw>
+          </a:effectLst>
+        </p:spPr>
+        <p:style>
+          <a:lnRef idx="2">
+            <a:schemeClr val="accent1">
+              <a:shade val="50000"/>
+            </a:schemeClr>
+          </a:lnRef>
+          <a:fillRef idx="1">
+            <a:schemeClr val="accent1"/>
+          </a:fillRef>
+          <a:effectRef idx="0">
+            <a:schemeClr val="accent1"/>
+          </a:effectRef>
+          <a:fontRef idx="minor">
+            <a:schemeClr val="lt1"/>
+          </a:fontRef>
+        </p:style>
+        <p:txBody>
+          <a:bodyPr rtlCol="0" anchor="ctr"/>
+          <a:lstStyle/>
+          <a:p>
+            <a:pPr algn="ctr"/>
+            <a:endParaRPr lang="en-US"/>
+          </a:p>
+        </p:txBody>
+      </p:sp>
+      <p:sp>
+        <p:nvSpPr>
+          <p:cNvPr id="45" name="Rectangle 44"/>
+          <p:cNvSpPr/>
+          <p:nvPr/>
+        </p:nvSpPr>
+        <p:spPr>
+          <a:xfrm>
+            <a:off x="8479862" y="5183099"/>
+            <a:ext cx="1346200" cy="1348284"/>
+          </a:xfrm>
+          <a:prstGeom prst="rect">
+            <a:avLst/>
+          </a:prstGeom>
+          <a:gradFill>
+            <a:gsLst>
+              <a:gs pos="0">
+                <a:srgbClr val="FDFDFD"/>
+              </a:gs>
+              <a:gs pos="100000">
+                <a:srgbClr val="B7B7B8"/>
+              </a:gs>
+            </a:gsLst>
+            <a:lin ang="5400000" scaled="1"/>
+          </a:gradFill>
+          <a:ln w="28575">
+            <a:solidFill>
+              <a:schemeClr val="tx1"/>
+            </a:solidFill>
+          </a:ln>
+          <a:effectLst>
+            <a:innerShdw blurRad="266700">
+              <a:schemeClr val="tx1"/>
+            </a:innerShdw>
+          </a:effectLst>
+        </p:spPr>
+        <p:style>
+          <a:lnRef idx="2">
+            <a:schemeClr val="accent1">
+              <a:shade val="50000"/>
+            </a:schemeClr>
+          </a:lnRef>
+          <a:fillRef idx="1">
+            <a:schemeClr val="accent1"/>
+          </a:fillRef>
+          <a:effectRef idx="0">
+            <a:schemeClr val="accent1"/>
+          </a:effectRef>
+          <a:fontRef idx="minor">
+            <a:schemeClr val="lt1"/>
+          </a:fontRef>
+        </p:style>
+        <p:txBody>
+          <a:bodyPr rtlCol="0" anchor="ctr"/>
+          <a:lstStyle/>
+          <a:p>
+            <a:pPr algn="ctr"/>
+            <a:endParaRPr lang="en-US"/>
+          </a:p>
+        </p:txBody>
+      </p:sp>
+      <p:sp>
+        <p:nvSpPr>
+          <p:cNvPr id="46" name="Round Same Side Corner Rectangle 45"/>
+          <p:cNvSpPr/>
+          <p:nvPr/>
+        </p:nvSpPr>
+        <p:spPr>
+          <a:xfrm rot="5400000">
+            <a:off x="10505871" y="5181581"/>
+            <a:ext cx="1348285" cy="1351322"/>
+          </a:xfrm>
+          <a:prstGeom prst="round2SameRect">
+            <a:avLst/>
+          </a:prstGeom>
+          <a:gradFill>
+            <a:gsLst>
+              <a:gs pos="0">
+                <a:srgbClr val="FDFDFD"/>
+              </a:gs>
+              <a:gs pos="100000">
+                <a:srgbClr val="B7B7B8"/>
+              </a:gs>
+            </a:gsLst>
+            <a:lin ang="0" scaled="0"/>
+          </a:gradFill>
+          <a:ln w="28575">
+            <a:solidFill>
+              <a:schemeClr val="tx1"/>
+            </a:solidFill>
+          </a:ln>
+          <a:effectLst>
+            <a:innerShdw blurRad="266700">
+              <a:schemeClr val="tx1"/>
+            </a:innerShdw>
+          </a:effectLst>
+        </p:spPr>
+        <p:style>
+          <a:lnRef idx="2">
+            <a:schemeClr val="accent1">
+              <a:shade val="50000"/>
+            </a:schemeClr>
+          </a:lnRef>
+          <a:fillRef idx="1">
+            <a:schemeClr val="accent1"/>
+          </a:fillRef>
+          <a:effectRef idx="0">
+            <a:schemeClr val="accent1"/>
+          </a:effectRef>
+          <a:fontRef idx="minor">
+            <a:schemeClr val="lt1"/>
+          </a:fontRef>
+        </p:style>
+        <p:txBody>
+          <a:bodyPr rtlCol="0" anchor="ctr"/>
+          <a:lstStyle/>
+          <a:p>
+            <a:pPr algn="ctr"/>
+            <a:endParaRPr lang="en-US"/>
+          </a:p>
+        </p:txBody>
+      </p:sp>
+      <p:sp>
+        <p:nvSpPr>
+          <p:cNvPr id="47" name="Round Same Side Corner Rectangle 46"/>
+          <p:cNvSpPr/>
+          <p:nvPr/>
+        </p:nvSpPr>
+        <p:spPr>
+          <a:xfrm rot="16200000">
+            <a:off x="6452809" y="5185182"/>
+            <a:ext cx="1346202" cy="1346199"/>
+          </a:xfrm>
+          <a:prstGeom prst="round2SameRect">
+            <a:avLst/>
+          </a:prstGeom>
+          <a:gradFill>
+            <a:gsLst>
+              <a:gs pos="0">
+                <a:srgbClr val="FDFDFD"/>
+              </a:gs>
+              <a:gs pos="100000">
+                <a:srgbClr val="B7B7B8"/>
+              </a:gs>
+            </a:gsLst>
+            <a:lin ang="10800000" scaled="0"/>
+          </a:gradFill>
+          <a:ln w="28575">
+            <a:solidFill>
+              <a:schemeClr val="tx1"/>
+            </a:solidFill>
+          </a:ln>
+          <a:effectLst>
+            <a:innerShdw blurRad="266700">
+              <a:schemeClr val="tx1"/>
             </a:innerShdw>
           </a:effectLst>
         </p:spPr>

</xml_diff>

<commit_message>
Adding GUI control rendering based on colors with a RGB packed overlay containing Shadow, Highlight, ColorMask in RGB respective.
</commit_message>
<xml_diff>
--- a/Docs/Gui.pptx
+++ b/Docs/Gui.pptx
@@ -244,7 +244,7 @@
           <a:p>
             <a:fld id="{47491EC4-C74A-4DCB-BF28-C0A7248C12D2}" type="datetimeFigureOut">
               <a:rPr lang="en-US" smtClean="0"/>
-              <a:t>12/19/2013</a:t>
+              <a:t>1/13/2014</a:t>
             </a:fld>
             <a:endParaRPr lang="en-US"/>
           </a:p>
@@ -414,7 +414,7 @@
           <a:p>
             <a:fld id="{47491EC4-C74A-4DCB-BF28-C0A7248C12D2}" type="datetimeFigureOut">
               <a:rPr lang="en-US" smtClean="0"/>
-              <a:t>12/19/2013</a:t>
+              <a:t>1/13/2014</a:t>
             </a:fld>
             <a:endParaRPr lang="en-US"/>
           </a:p>
@@ -594,7 +594,7 @@
           <a:p>
             <a:fld id="{47491EC4-C74A-4DCB-BF28-C0A7248C12D2}" type="datetimeFigureOut">
               <a:rPr lang="en-US" smtClean="0"/>
-              <a:t>12/19/2013</a:t>
+              <a:t>1/13/2014</a:t>
             </a:fld>
             <a:endParaRPr lang="en-US"/>
           </a:p>
@@ -764,7 +764,7 @@
           <a:p>
             <a:fld id="{47491EC4-C74A-4DCB-BF28-C0A7248C12D2}" type="datetimeFigureOut">
               <a:rPr lang="en-US" smtClean="0"/>
-              <a:t>12/19/2013</a:t>
+              <a:t>1/13/2014</a:t>
             </a:fld>
             <a:endParaRPr lang="en-US"/>
           </a:p>
@@ -1010,7 +1010,7 @@
           <a:p>
             <a:fld id="{47491EC4-C74A-4DCB-BF28-C0A7248C12D2}" type="datetimeFigureOut">
               <a:rPr lang="en-US" smtClean="0"/>
-              <a:t>12/19/2013</a:t>
+              <a:t>1/13/2014</a:t>
             </a:fld>
             <a:endParaRPr lang="en-US"/>
           </a:p>
@@ -1242,7 +1242,7 @@
           <a:p>
             <a:fld id="{47491EC4-C74A-4DCB-BF28-C0A7248C12D2}" type="datetimeFigureOut">
               <a:rPr lang="en-US" smtClean="0"/>
-              <a:t>12/19/2013</a:t>
+              <a:t>1/13/2014</a:t>
             </a:fld>
             <a:endParaRPr lang="en-US"/>
           </a:p>
@@ -1609,7 +1609,7 @@
           <a:p>
             <a:fld id="{47491EC4-C74A-4DCB-BF28-C0A7248C12D2}" type="datetimeFigureOut">
               <a:rPr lang="en-US" smtClean="0"/>
-              <a:t>12/19/2013</a:t>
+              <a:t>1/13/2014</a:t>
             </a:fld>
             <a:endParaRPr lang="en-US"/>
           </a:p>
@@ -1727,7 +1727,7 @@
           <a:p>
             <a:fld id="{47491EC4-C74A-4DCB-BF28-C0A7248C12D2}" type="datetimeFigureOut">
               <a:rPr lang="en-US" smtClean="0"/>
-              <a:t>12/19/2013</a:t>
+              <a:t>1/13/2014</a:t>
             </a:fld>
             <a:endParaRPr lang="en-US"/>
           </a:p>
@@ -1822,7 +1822,7 @@
           <a:p>
             <a:fld id="{47491EC4-C74A-4DCB-BF28-C0A7248C12D2}" type="datetimeFigureOut">
               <a:rPr lang="en-US" smtClean="0"/>
-              <a:t>12/19/2013</a:t>
+              <a:t>1/13/2014</a:t>
             </a:fld>
             <a:endParaRPr lang="en-US"/>
           </a:p>
@@ -2099,7 +2099,7 @@
           <a:p>
             <a:fld id="{47491EC4-C74A-4DCB-BF28-C0A7248C12D2}" type="datetimeFigureOut">
               <a:rPr lang="en-US" smtClean="0"/>
-              <a:t>12/19/2013</a:t>
+              <a:t>1/13/2014</a:t>
             </a:fld>
             <a:endParaRPr lang="en-US"/>
           </a:p>
@@ -2352,7 +2352,7 @@
           <a:p>
             <a:fld id="{47491EC4-C74A-4DCB-BF28-C0A7248C12D2}" type="datetimeFigureOut">
               <a:rPr lang="en-US" smtClean="0"/>
-              <a:t>12/19/2013</a:t>
+              <a:t>1/13/2014</a:t>
             </a:fld>
             <a:endParaRPr lang="en-US"/>
           </a:p>
@@ -2565,7 +2565,7 @@
           <a:p>
             <a:fld id="{47491EC4-C74A-4DCB-BF28-C0A7248C12D2}" type="datetimeFigureOut">
               <a:rPr lang="en-US" smtClean="0"/>
-              <a:t>12/19/2013</a:t>
+              <a:t>1/13/2014</a:t>
             </a:fld>
             <a:endParaRPr lang="en-US"/>
           </a:p>
@@ -3309,7 +3309,7 @@
         </p:nvSpPr>
         <p:spPr>
           <a:xfrm rot="5400000">
-            <a:off x="7714845" y="5378375"/>
+            <a:off x="10466137" y="5432421"/>
             <a:ext cx="810434" cy="698650"/>
           </a:xfrm>
           <a:prstGeom prst="triangle">
@@ -3482,7 +3482,7 @@
         </p:nvSpPr>
         <p:spPr>
           <a:xfrm>
-            <a:off x="3618971" y="5054600"/>
+            <a:off x="2078820" y="5054600"/>
             <a:ext cx="1346200" cy="1346200"/>
           </a:xfrm>
           <a:prstGeom prst="roundRect">
@@ -3547,7 +3547,7 @@
         </p:nvSpPr>
         <p:spPr>
           <a:xfrm>
-            <a:off x="3618971" y="5054600"/>
+            <a:off x="2260180" y="5054600"/>
             <a:ext cx="1346200" cy="1346200"/>
           </a:xfrm>
           <a:prstGeom prst="roundRect">
@@ -4014,7 +4014,7 @@
         </p:nvSpPr>
         <p:spPr>
           <a:xfrm>
-            <a:off x="3986742" y="7097183"/>
+            <a:off x="4171351" y="7097183"/>
             <a:ext cx="1346200" cy="1346200"/>
           </a:xfrm>
           <a:prstGeom prst="roundRect">
@@ -4079,7 +4079,7 @@
         </p:nvSpPr>
         <p:spPr>
           <a:xfrm>
-            <a:off x="5603070" y="7097183"/>
+            <a:off x="5720825" y="7097183"/>
             <a:ext cx="1346200" cy="1346200"/>
           </a:xfrm>
           <a:prstGeom prst="roundRect">
@@ -4832,6 +4832,124 @@
             <a:innerShdw blurRad="266700">
               <a:prstClr val="black"/>
             </a:innerShdw>
+          </a:effectLst>
+        </p:spPr>
+        <p:style>
+          <a:lnRef idx="2">
+            <a:schemeClr val="accent1">
+              <a:shade val="50000"/>
+            </a:schemeClr>
+          </a:lnRef>
+          <a:fillRef idx="1">
+            <a:schemeClr val="accent1"/>
+          </a:fillRef>
+          <a:effectRef idx="0">
+            <a:schemeClr val="accent1"/>
+          </a:effectRef>
+          <a:fontRef idx="minor">
+            <a:schemeClr val="lt1"/>
+          </a:fontRef>
+        </p:style>
+        <p:txBody>
+          <a:bodyPr rtlCol="0" anchor="ctr"/>
+          <a:lstStyle/>
+          <a:p>
+            <a:pPr algn="ctr"/>
+            <a:endParaRPr lang="en-US"/>
+          </a:p>
+        </p:txBody>
+      </p:sp>
+      <p:sp>
+        <p:nvSpPr>
+          <p:cNvPr id="47" name="Rounded Rectangle 46"/>
+          <p:cNvSpPr/>
+          <p:nvPr/>
+        </p:nvSpPr>
+        <p:spPr>
+          <a:xfrm>
+            <a:off x="7539603" y="4955808"/>
+            <a:ext cx="1346200" cy="1346200"/>
+          </a:xfrm>
+          <a:prstGeom prst="roundRect">
+            <a:avLst>
+              <a:gd name="adj" fmla="val 16667"/>
+            </a:avLst>
+          </a:prstGeom>
+          <a:solidFill>
+            <a:srgbClr val="91A3B4"/>
+          </a:solidFill>
+          <a:ln w="28575">
+            <a:noFill/>
+          </a:ln>
+          <a:effectLst/>
+        </p:spPr>
+        <p:style>
+          <a:lnRef idx="2">
+            <a:schemeClr val="accent1">
+              <a:shade val="50000"/>
+            </a:schemeClr>
+          </a:lnRef>
+          <a:fillRef idx="1">
+            <a:schemeClr val="accent1"/>
+          </a:fillRef>
+          <a:effectRef idx="0">
+            <a:schemeClr val="accent1"/>
+          </a:effectRef>
+          <a:fontRef idx="minor">
+            <a:schemeClr val="lt1"/>
+          </a:fontRef>
+        </p:style>
+        <p:txBody>
+          <a:bodyPr rtlCol="0" anchor="ctr"/>
+          <a:lstStyle/>
+          <a:p>
+            <a:pPr algn="ctr"/>
+            <a:endParaRPr lang="en-US"/>
+          </a:p>
+        </p:txBody>
+      </p:sp>
+      <p:sp>
+        <p:nvSpPr>
+          <p:cNvPr id="48" name="Rounded Rectangle 47"/>
+          <p:cNvSpPr/>
+          <p:nvPr/>
+        </p:nvSpPr>
+        <p:spPr>
+          <a:xfrm>
+            <a:off x="4118650" y="5054600"/>
+            <a:ext cx="1346200" cy="1346200"/>
+          </a:xfrm>
+          <a:prstGeom prst="roundRect">
+            <a:avLst>
+              <a:gd name="adj" fmla="val 16667"/>
+            </a:avLst>
+          </a:prstGeom>
+          <a:gradFill>
+            <a:gsLst>
+              <a:gs pos="0">
+                <a:srgbClr val="FF0000">
+                  <a:alpha val="0"/>
+                </a:srgbClr>
+              </a:gs>
+              <a:gs pos="100000">
+                <a:srgbClr val="FF0000">
+                  <a:alpha val="14000"/>
+                </a:srgbClr>
+              </a:gs>
+            </a:gsLst>
+            <a:lin ang="5400000" scaled="1"/>
+          </a:gradFill>
+          <a:ln w="28575">
+            <a:solidFill>
+              <a:srgbClr val="FF0000"/>
+            </a:solidFill>
+          </a:ln>
+          <a:effectLst>
+            <a:outerShdw blurRad="50800" dist="38100" dir="2700000" sx="101000" sy="101000" algn="tl" rotWithShape="0">
+              <a:srgbClr val="00FF00">
+                <a:alpha val="40000"/>
+              </a:srgbClr>
+            </a:outerShdw>
           </a:effectLst>
         </p:spPr>
         <p:style>

</xml_diff>

<commit_message>
Added a grid view for images and a directory explorer extension.
</commit_message>
<xml_diff>
--- a/Docs/Gui.pptx
+++ b/Docs/Gui.pptx
@@ -7,6 +7,7 @@
   <p:sldIdLst>
     <p:sldId id="256" r:id="rId2"/>
     <p:sldId id="257" r:id="rId3"/>
+    <p:sldId id="258" r:id="rId4"/>
   </p:sldIdLst>
   <p:sldSz cx="12192000" cy="6858000"/>
   <p:notesSz cx="6858000" cy="9144000"/>
@@ -244,7 +245,7 @@
           <a:p>
             <a:fld id="{47491EC4-C74A-4DCB-BF28-C0A7248C12D2}" type="datetimeFigureOut">
               <a:rPr lang="en-US" smtClean="0"/>
-              <a:t>1/13/2014</a:t>
+              <a:t>1/15/2014</a:t>
             </a:fld>
             <a:endParaRPr lang="en-US"/>
           </a:p>
@@ -414,7 +415,7 @@
           <a:p>
             <a:fld id="{47491EC4-C74A-4DCB-BF28-C0A7248C12D2}" type="datetimeFigureOut">
               <a:rPr lang="en-US" smtClean="0"/>
-              <a:t>1/13/2014</a:t>
+              <a:t>1/15/2014</a:t>
             </a:fld>
             <a:endParaRPr lang="en-US"/>
           </a:p>
@@ -594,7 +595,7 @@
           <a:p>
             <a:fld id="{47491EC4-C74A-4DCB-BF28-C0A7248C12D2}" type="datetimeFigureOut">
               <a:rPr lang="en-US" smtClean="0"/>
-              <a:t>1/13/2014</a:t>
+              <a:t>1/15/2014</a:t>
             </a:fld>
             <a:endParaRPr lang="en-US"/>
           </a:p>
@@ -764,7 +765,7 @@
           <a:p>
             <a:fld id="{47491EC4-C74A-4DCB-BF28-C0A7248C12D2}" type="datetimeFigureOut">
               <a:rPr lang="en-US" smtClean="0"/>
-              <a:t>1/13/2014</a:t>
+              <a:t>1/15/2014</a:t>
             </a:fld>
             <a:endParaRPr lang="en-US"/>
           </a:p>
@@ -1010,7 +1011,7 @@
           <a:p>
             <a:fld id="{47491EC4-C74A-4DCB-BF28-C0A7248C12D2}" type="datetimeFigureOut">
               <a:rPr lang="en-US" smtClean="0"/>
-              <a:t>1/13/2014</a:t>
+              <a:t>1/15/2014</a:t>
             </a:fld>
             <a:endParaRPr lang="en-US"/>
           </a:p>
@@ -1242,7 +1243,7 @@
           <a:p>
             <a:fld id="{47491EC4-C74A-4DCB-BF28-C0A7248C12D2}" type="datetimeFigureOut">
               <a:rPr lang="en-US" smtClean="0"/>
-              <a:t>1/13/2014</a:t>
+              <a:t>1/15/2014</a:t>
             </a:fld>
             <a:endParaRPr lang="en-US"/>
           </a:p>
@@ -1609,7 +1610,7 @@
           <a:p>
             <a:fld id="{47491EC4-C74A-4DCB-BF28-C0A7248C12D2}" type="datetimeFigureOut">
               <a:rPr lang="en-US" smtClean="0"/>
-              <a:t>1/13/2014</a:t>
+              <a:t>1/15/2014</a:t>
             </a:fld>
             <a:endParaRPr lang="en-US"/>
           </a:p>
@@ -1727,7 +1728,7 @@
           <a:p>
             <a:fld id="{47491EC4-C74A-4DCB-BF28-C0A7248C12D2}" type="datetimeFigureOut">
               <a:rPr lang="en-US" smtClean="0"/>
-              <a:t>1/13/2014</a:t>
+              <a:t>1/15/2014</a:t>
             </a:fld>
             <a:endParaRPr lang="en-US"/>
           </a:p>
@@ -1822,7 +1823,7 @@
           <a:p>
             <a:fld id="{47491EC4-C74A-4DCB-BF28-C0A7248C12D2}" type="datetimeFigureOut">
               <a:rPr lang="en-US" smtClean="0"/>
-              <a:t>1/13/2014</a:t>
+              <a:t>1/15/2014</a:t>
             </a:fld>
             <a:endParaRPr lang="en-US"/>
           </a:p>
@@ -2099,7 +2100,7 @@
           <a:p>
             <a:fld id="{47491EC4-C74A-4DCB-BF28-C0A7248C12D2}" type="datetimeFigureOut">
               <a:rPr lang="en-US" smtClean="0"/>
-              <a:t>1/13/2014</a:t>
+              <a:t>1/15/2014</a:t>
             </a:fld>
             <a:endParaRPr lang="en-US"/>
           </a:p>
@@ -2352,7 +2353,7 @@
           <a:p>
             <a:fld id="{47491EC4-C74A-4DCB-BF28-C0A7248C12D2}" type="datetimeFigureOut">
               <a:rPr lang="en-US" smtClean="0"/>
-              <a:t>1/13/2014</a:t>
+              <a:t>1/15/2014</a:t>
             </a:fld>
             <a:endParaRPr lang="en-US"/>
           </a:p>
@@ -2565,7 +2566,7 @@
           <a:p>
             <a:fld id="{47491EC4-C74A-4DCB-BF28-C0A7248C12D2}" type="datetimeFigureOut">
               <a:rPr lang="en-US" smtClean="0"/>
-              <a:t>1/13/2014</a:t>
+              <a:t>1/15/2014</a:t>
             </a:fld>
             <a:endParaRPr lang="en-US"/>
           </a:p>
@@ -7203,6 +7204,181 @@
 </p:sld>
 </file>
 
+<file path=ppt/slides/slide3.xml><?xml version="1.0" encoding="utf-8"?>
+<p:sld xmlns:a="http://schemas.openxmlformats.org/drawingml/2006/main" xmlns:r="http://schemas.openxmlformats.org/officeDocument/2006/relationships" xmlns:p="http://schemas.openxmlformats.org/presentationml/2006/main">
+  <p:cSld>
+    <p:spTree>
+      <p:nvGrpSpPr>
+        <p:cNvPr id="1" name=""/>
+        <p:cNvGrpSpPr/>
+        <p:nvPr/>
+      </p:nvGrpSpPr>
+      <p:grpSpPr>
+        <a:xfrm>
+          <a:off x="0" y="0"/>
+          <a:ext cx="0" cy="0"/>
+          <a:chOff x="0" y="0"/>
+          <a:chExt cx="0" cy="0"/>
+        </a:xfrm>
+      </p:grpSpPr>
+      <p:sp>
+        <p:nvSpPr>
+          <p:cNvPr id="5" name="Rectangle 4"/>
+          <p:cNvSpPr/>
+          <p:nvPr/>
+        </p:nvSpPr>
+        <p:spPr>
+          <a:xfrm>
+            <a:off x="0" y="299533"/>
+            <a:ext cx="12192000" cy="2159000"/>
+          </a:xfrm>
+          <a:prstGeom prst="rect">
+            <a:avLst/>
+          </a:prstGeom>
+          <a:solidFill>
+            <a:schemeClr val="bg1">
+              <a:lumMod val="75000"/>
+            </a:schemeClr>
+          </a:solidFill>
+        </p:spPr>
+        <p:style>
+          <a:lnRef idx="2">
+            <a:schemeClr val="accent1">
+              <a:shade val="50000"/>
+            </a:schemeClr>
+          </a:lnRef>
+          <a:fillRef idx="1">
+            <a:schemeClr val="accent1"/>
+          </a:fillRef>
+          <a:effectRef idx="0">
+            <a:schemeClr val="accent1"/>
+          </a:effectRef>
+          <a:fontRef idx="minor">
+            <a:schemeClr val="lt1"/>
+          </a:fontRef>
+        </p:style>
+        <p:txBody>
+          <a:bodyPr rtlCol="0" anchor="ctr"/>
+          <a:lstStyle/>
+          <a:p>
+            <a:pPr algn="ctr"/>
+            <a:endParaRPr lang="en-US"/>
+          </a:p>
+        </p:txBody>
+      </p:sp>
+      <p:sp>
+        <p:nvSpPr>
+          <p:cNvPr id="4" name="Folded Corner 3"/>
+          <p:cNvSpPr/>
+          <p:nvPr/>
+        </p:nvSpPr>
+        <p:spPr>
+          <a:xfrm>
+            <a:off x="1243619" y="664317"/>
+            <a:ext cx="1346200" cy="1346200"/>
+          </a:xfrm>
+          <a:prstGeom prst="foldedCorner">
+            <a:avLst>
+              <a:gd name="adj" fmla="val 50000"/>
+            </a:avLst>
+          </a:prstGeom>
+          <a:solidFill>
+            <a:schemeClr val="bg1"/>
+          </a:solidFill>
+          <a:ln w="95250">
+            <a:solidFill>
+              <a:schemeClr val="tx1"/>
+            </a:solidFill>
+          </a:ln>
+          <a:effectLst/>
+        </p:spPr>
+        <p:style>
+          <a:lnRef idx="2">
+            <a:schemeClr val="accent1">
+              <a:shade val="50000"/>
+            </a:schemeClr>
+          </a:lnRef>
+          <a:fillRef idx="1">
+            <a:schemeClr val="accent1"/>
+          </a:fillRef>
+          <a:effectRef idx="0">
+            <a:schemeClr val="accent1"/>
+          </a:effectRef>
+          <a:fontRef idx="minor">
+            <a:schemeClr val="lt1"/>
+          </a:fontRef>
+        </p:style>
+        <p:txBody>
+          <a:bodyPr rtlCol="0" anchor="ctr"/>
+          <a:lstStyle/>
+          <a:p>
+            <a:pPr algn="ctr"/>
+            <a:endParaRPr lang="en-US"/>
+          </a:p>
+        </p:txBody>
+      </p:sp>
+      <p:sp>
+        <p:nvSpPr>
+          <p:cNvPr id="8" name="&quot;No&quot; Symbol 7"/>
+          <p:cNvSpPr/>
+          <p:nvPr/>
+        </p:nvSpPr>
+        <p:spPr>
+          <a:xfrm>
+            <a:off x="5257800" y="3200400"/>
+            <a:ext cx="2794000" cy="2794000"/>
+          </a:xfrm>
+          <a:prstGeom prst="noSmoking">
+            <a:avLst>
+              <a:gd name="adj" fmla="val 6910"/>
+            </a:avLst>
+          </a:prstGeom>
+          <a:solidFill>
+            <a:srgbClr val="C00000"/>
+          </a:solidFill>
+        </p:spPr>
+        <p:style>
+          <a:lnRef idx="2">
+            <a:schemeClr val="accent1">
+              <a:shade val="50000"/>
+            </a:schemeClr>
+          </a:lnRef>
+          <a:fillRef idx="1">
+            <a:schemeClr val="accent1"/>
+          </a:fillRef>
+          <a:effectRef idx="0">
+            <a:schemeClr val="accent1"/>
+          </a:effectRef>
+          <a:fontRef idx="minor">
+            <a:schemeClr val="lt1"/>
+          </a:fontRef>
+        </p:style>
+        <p:txBody>
+          <a:bodyPr rtlCol="0" anchor="ctr"/>
+          <a:lstStyle/>
+          <a:p>
+            <a:pPr algn="ctr"/>
+            <a:endParaRPr lang="en-US">
+              <a:solidFill>
+                <a:schemeClr val="tx1"/>
+              </a:solidFill>
+            </a:endParaRPr>
+          </a:p>
+        </p:txBody>
+      </p:sp>
+    </p:spTree>
+    <p:extLst>
+      <p:ext uri="{BB962C8B-B14F-4D97-AF65-F5344CB8AC3E}">
+        <p14:creationId xmlns:p14="http://schemas.microsoft.com/office/powerpoint/2010/main" val="3015496195"/>
+      </p:ext>
+    </p:extLst>
+  </p:cSld>
+  <p:clrMapOvr>
+    <a:masterClrMapping/>
+  </p:clrMapOvr>
+</p:sld>
+</file>
+
 <file path=ppt/theme/theme1.xml><?xml version="1.0" encoding="utf-8"?>
 <a:theme xmlns:a="http://schemas.openxmlformats.org/drawingml/2006/main" name="Office Theme">
   <a:themeElements>

</xml_diff>

<commit_message>
More work on the control spiller. Added a lot of resize support.
</commit_message>
<xml_diff>
--- a/Docs/Gui.pptx
+++ b/Docs/Gui.pptx
@@ -245,7 +245,7 @@
           <a:p>
             <a:fld id="{47491EC4-C74A-4DCB-BF28-C0A7248C12D2}" type="datetimeFigureOut">
               <a:rPr lang="en-US" smtClean="0"/>
-              <a:t>1/15/2014</a:t>
+              <a:t>1/21/2014</a:t>
             </a:fld>
             <a:endParaRPr lang="en-US"/>
           </a:p>
@@ -415,7 +415,7 @@
           <a:p>
             <a:fld id="{47491EC4-C74A-4DCB-BF28-C0A7248C12D2}" type="datetimeFigureOut">
               <a:rPr lang="en-US" smtClean="0"/>
-              <a:t>1/15/2014</a:t>
+              <a:t>1/21/2014</a:t>
             </a:fld>
             <a:endParaRPr lang="en-US"/>
           </a:p>
@@ -595,7 +595,7 @@
           <a:p>
             <a:fld id="{47491EC4-C74A-4DCB-BF28-C0A7248C12D2}" type="datetimeFigureOut">
               <a:rPr lang="en-US" smtClean="0"/>
-              <a:t>1/15/2014</a:t>
+              <a:t>1/21/2014</a:t>
             </a:fld>
             <a:endParaRPr lang="en-US"/>
           </a:p>
@@ -765,7 +765,7 @@
           <a:p>
             <a:fld id="{47491EC4-C74A-4DCB-BF28-C0A7248C12D2}" type="datetimeFigureOut">
               <a:rPr lang="en-US" smtClean="0"/>
-              <a:t>1/15/2014</a:t>
+              <a:t>1/21/2014</a:t>
             </a:fld>
             <a:endParaRPr lang="en-US"/>
           </a:p>
@@ -1011,7 +1011,7 @@
           <a:p>
             <a:fld id="{47491EC4-C74A-4DCB-BF28-C0A7248C12D2}" type="datetimeFigureOut">
               <a:rPr lang="en-US" smtClean="0"/>
-              <a:t>1/15/2014</a:t>
+              <a:t>1/21/2014</a:t>
             </a:fld>
             <a:endParaRPr lang="en-US"/>
           </a:p>
@@ -1243,7 +1243,7 @@
           <a:p>
             <a:fld id="{47491EC4-C74A-4DCB-BF28-C0A7248C12D2}" type="datetimeFigureOut">
               <a:rPr lang="en-US" smtClean="0"/>
-              <a:t>1/15/2014</a:t>
+              <a:t>1/21/2014</a:t>
             </a:fld>
             <a:endParaRPr lang="en-US"/>
           </a:p>
@@ -1610,7 +1610,7 @@
           <a:p>
             <a:fld id="{47491EC4-C74A-4DCB-BF28-C0A7248C12D2}" type="datetimeFigureOut">
               <a:rPr lang="en-US" smtClean="0"/>
-              <a:t>1/15/2014</a:t>
+              <a:t>1/21/2014</a:t>
             </a:fld>
             <a:endParaRPr lang="en-US"/>
           </a:p>
@@ -1728,7 +1728,7 @@
           <a:p>
             <a:fld id="{47491EC4-C74A-4DCB-BF28-C0A7248C12D2}" type="datetimeFigureOut">
               <a:rPr lang="en-US" smtClean="0"/>
-              <a:t>1/15/2014</a:t>
+              <a:t>1/21/2014</a:t>
             </a:fld>
             <a:endParaRPr lang="en-US"/>
           </a:p>
@@ -1823,7 +1823,7 @@
           <a:p>
             <a:fld id="{47491EC4-C74A-4DCB-BF28-C0A7248C12D2}" type="datetimeFigureOut">
               <a:rPr lang="en-US" smtClean="0"/>
-              <a:t>1/15/2014</a:t>
+              <a:t>1/21/2014</a:t>
             </a:fld>
             <a:endParaRPr lang="en-US"/>
           </a:p>
@@ -2100,7 +2100,7 @@
           <a:p>
             <a:fld id="{47491EC4-C74A-4DCB-BF28-C0A7248C12D2}" type="datetimeFigureOut">
               <a:rPr lang="en-US" smtClean="0"/>
-              <a:t>1/15/2014</a:t>
+              <a:t>1/21/2014</a:t>
             </a:fld>
             <a:endParaRPr lang="en-US"/>
           </a:p>
@@ -2353,7 +2353,7 @@
           <a:p>
             <a:fld id="{47491EC4-C74A-4DCB-BF28-C0A7248C12D2}" type="datetimeFigureOut">
               <a:rPr lang="en-US" smtClean="0"/>
-              <a:t>1/15/2014</a:t>
+              <a:t>1/21/2014</a:t>
             </a:fld>
             <a:endParaRPr lang="en-US"/>
           </a:p>
@@ -2566,7 +2566,7 @@
           <a:p>
             <a:fld id="{47491EC4-C74A-4DCB-BF28-C0A7248C12D2}" type="datetimeFigureOut">
               <a:rPr lang="en-US" smtClean="0"/>
-              <a:t>1/15/2014</a:t>
+              <a:t>1/21/2014</a:t>
             </a:fld>
             <a:endParaRPr lang="en-US"/>
           </a:p>
@@ -6272,175 +6272,6 @@
           </a:p>
         </p:txBody>
       </p:sp>
-      <p:sp>
-        <p:nvSpPr>
-          <p:cNvPr id="28" name="Rounded Rectangle 27"/>
-          <p:cNvSpPr/>
-          <p:nvPr/>
-        </p:nvSpPr>
-        <p:spPr>
-          <a:xfrm>
-            <a:off x="431485" y="5176692"/>
-            <a:ext cx="1346200" cy="1346200"/>
-          </a:xfrm>
-          <a:prstGeom prst="roundRect">
-            <a:avLst>
-              <a:gd name="adj" fmla="val 16667"/>
-            </a:avLst>
-          </a:prstGeom>
-          <a:solidFill>
-            <a:srgbClr val="B7B7B8"/>
-          </a:solidFill>
-          <a:ln w="28575">
-            <a:solidFill>
-              <a:schemeClr val="tx1"/>
-            </a:solidFill>
-          </a:ln>
-          <a:effectLst/>
-        </p:spPr>
-        <p:style>
-          <a:lnRef idx="2">
-            <a:schemeClr val="accent1">
-              <a:shade val="50000"/>
-            </a:schemeClr>
-          </a:lnRef>
-          <a:fillRef idx="1">
-            <a:schemeClr val="accent1"/>
-          </a:fillRef>
-          <a:effectRef idx="0">
-            <a:schemeClr val="accent1"/>
-          </a:effectRef>
-          <a:fontRef idx="minor">
-            <a:schemeClr val="lt1"/>
-          </a:fontRef>
-        </p:style>
-        <p:txBody>
-          <a:bodyPr rtlCol="0" anchor="ctr"/>
-          <a:lstStyle/>
-          <a:p>
-            <a:pPr algn="ctr"/>
-            <a:endParaRPr lang="en-US"/>
-          </a:p>
-        </p:txBody>
-      </p:sp>
-      <p:cxnSp>
-        <p:nvCxnSpPr>
-          <p:cNvPr id="29" name="Straight Connector 28"/>
-          <p:cNvCxnSpPr/>
-          <p:nvPr/>
-        </p:nvCxnSpPr>
-        <p:spPr>
-          <a:xfrm>
-            <a:off x="431485" y="5498621"/>
-            <a:ext cx="1346200" cy="0"/>
-          </a:xfrm>
-          <a:prstGeom prst="line">
-            <a:avLst/>
-          </a:prstGeom>
-          <a:ln w="28575">
-            <a:solidFill>
-              <a:schemeClr val="tx1"/>
-            </a:solidFill>
-          </a:ln>
-        </p:spPr>
-        <p:style>
-          <a:lnRef idx="1">
-            <a:schemeClr val="accent1"/>
-          </a:lnRef>
-          <a:fillRef idx="0">
-            <a:schemeClr val="accent1"/>
-          </a:fillRef>
-          <a:effectRef idx="0">
-            <a:schemeClr val="accent1"/>
-          </a:effectRef>
-          <a:fontRef idx="minor">
-            <a:schemeClr val="tx1"/>
-          </a:fontRef>
-        </p:style>
-      </p:cxnSp>
-      <p:cxnSp>
-        <p:nvCxnSpPr>
-          <p:cNvPr id="30" name="Straight Connector 29"/>
-          <p:cNvCxnSpPr/>
-          <p:nvPr/>
-        </p:nvCxnSpPr>
-        <p:spPr>
-          <a:xfrm>
-            <a:off x="794277" y="5498621"/>
-            <a:ext cx="0" cy="1024271"/>
-          </a:xfrm>
-          <a:prstGeom prst="line">
-            <a:avLst/>
-          </a:prstGeom>
-          <a:ln w="28575">
-            <a:solidFill>
-              <a:schemeClr val="tx1"/>
-            </a:solidFill>
-          </a:ln>
-        </p:spPr>
-        <p:style>
-          <a:lnRef idx="1">
-            <a:schemeClr val="accent1"/>
-          </a:lnRef>
-          <a:fillRef idx="0">
-            <a:schemeClr val="accent1"/>
-          </a:fillRef>
-          <a:effectRef idx="0">
-            <a:schemeClr val="accent1"/>
-          </a:effectRef>
-          <a:fontRef idx="minor">
-            <a:schemeClr val="tx1"/>
-          </a:fontRef>
-        </p:style>
-      </p:cxnSp>
-      <p:sp>
-        <p:nvSpPr>
-          <p:cNvPr id="31" name="Round Single Corner Rectangle 30"/>
-          <p:cNvSpPr/>
-          <p:nvPr/>
-        </p:nvSpPr>
-        <p:spPr>
-          <a:xfrm rot="5400000" flipV="1">
-            <a:off x="100745" y="5824598"/>
-            <a:ext cx="1024273" cy="362792"/>
-          </a:xfrm>
-          <a:prstGeom prst="round1Rect">
-            <a:avLst>
-              <a:gd name="adj" fmla="val 50000"/>
-            </a:avLst>
-          </a:prstGeom>
-          <a:solidFill>
-            <a:schemeClr val="tx1"/>
-          </a:solidFill>
-          <a:ln>
-            <a:noFill/>
-          </a:ln>
-        </p:spPr>
-        <p:style>
-          <a:lnRef idx="2">
-            <a:schemeClr val="accent1">
-              <a:shade val="50000"/>
-            </a:schemeClr>
-          </a:lnRef>
-          <a:fillRef idx="1">
-            <a:schemeClr val="accent1"/>
-          </a:fillRef>
-          <a:effectRef idx="0">
-            <a:schemeClr val="accent1"/>
-          </a:effectRef>
-          <a:fontRef idx="minor">
-            <a:schemeClr val="lt1"/>
-          </a:fontRef>
-        </p:style>
-        <p:txBody>
-          <a:bodyPr rtlCol="0" anchor="ctr"/>
-          <a:lstStyle/>
-          <a:p>
-            <a:pPr algn="ctr"/>
-            <a:endParaRPr lang="en-US"/>
-          </a:p>
-        </p:txBody>
-      </p:sp>
       <p:grpSp>
         <p:nvGrpSpPr>
           <p:cNvPr id="5" name="Group 4"/>
@@ -7191,6 +7022,161 @@
           </a:p>
         </p:txBody>
       </p:sp>
+      <p:grpSp>
+        <p:nvGrpSpPr>
+          <p:cNvPr id="3" name="Group 2"/>
+          <p:cNvGrpSpPr/>
+          <p:nvPr/>
+        </p:nvGrpSpPr>
+        <p:grpSpPr>
+          <a:xfrm>
+            <a:off x="472142" y="5173054"/>
+            <a:ext cx="1346201" cy="1346200"/>
+            <a:chOff x="472142" y="5173054"/>
+            <a:chExt cx="1346201" cy="1346200"/>
+          </a:xfrm>
+          <a:effectLst>
+            <a:outerShdw blurRad="50800" dist="38100" dir="2700000" sx="101000" sy="101000" algn="tl" rotWithShape="0">
+              <a:schemeClr val="bg1">
+                <a:alpha val="40000"/>
+              </a:schemeClr>
+            </a:outerShdw>
+          </a:effectLst>
+        </p:grpSpPr>
+        <p:sp>
+          <p:nvSpPr>
+            <p:cNvPr id="49" name="Rounded Rectangle 48"/>
+            <p:cNvSpPr/>
+            <p:nvPr/>
+          </p:nvSpPr>
+          <p:spPr>
+            <a:xfrm flipH="1">
+              <a:off x="472142" y="5173054"/>
+              <a:ext cx="1346200" cy="1346200"/>
+            </a:xfrm>
+            <a:prstGeom prst="roundRect">
+              <a:avLst>
+                <a:gd name="adj" fmla="val 16667"/>
+              </a:avLst>
+            </a:prstGeom>
+            <a:noFill/>
+            <a:ln w="63500">
+              <a:solidFill>
+                <a:schemeClr val="tx1"/>
+              </a:solidFill>
+            </a:ln>
+            <a:effectLst/>
+          </p:spPr>
+          <p:style>
+            <a:lnRef idx="2">
+              <a:schemeClr val="accent1">
+                <a:shade val="50000"/>
+              </a:schemeClr>
+            </a:lnRef>
+            <a:fillRef idx="1">
+              <a:schemeClr val="accent1"/>
+            </a:fillRef>
+            <a:effectRef idx="0">
+              <a:schemeClr val="accent1"/>
+            </a:effectRef>
+            <a:fontRef idx="minor">
+              <a:schemeClr val="lt1"/>
+            </a:fontRef>
+          </p:style>
+          <p:txBody>
+            <a:bodyPr rtlCol="0" anchor="ctr"/>
+            <a:lstStyle/>
+            <a:p>
+              <a:pPr algn="ctr"/>
+              <a:endParaRPr lang="en-US"/>
+            </a:p>
+          </p:txBody>
+        </p:sp>
+        <p:cxnSp>
+          <p:nvCxnSpPr>
+            <p:cNvPr id="50" name="Straight Connector 49"/>
+            <p:cNvCxnSpPr/>
+            <p:nvPr/>
+          </p:nvCxnSpPr>
+          <p:spPr>
+            <a:xfrm flipH="1">
+              <a:off x="472142" y="5494983"/>
+              <a:ext cx="1346200" cy="0"/>
+            </a:xfrm>
+            <a:prstGeom prst="line">
+              <a:avLst/>
+            </a:prstGeom>
+            <a:ln w="63500">
+              <a:solidFill>
+                <a:schemeClr val="tx1"/>
+              </a:solidFill>
+            </a:ln>
+          </p:spPr>
+          <p:style>
+            <a:lnRef idx="1">
+              <a:schemeClr val="accent1"/>
+            </a:lnRef>
+            <a:fillRef idx="0">
+              <a:schemeClr val="accent1"/>
+            </a:fillRef>
+            <a:effectRef idx="0">
+              <a:schemeClr val="accent1"/>
+            </a:effectRef>
+            <a:fontRef idx="minor">
+              <a:schemeClr val="tx1"/>
+            </a:fontRef>
+          </p:style>
+        </p:cxnSp>
+        <p:sp>
+          <p:nvSpPr>
+            <p:cNvPr id="2" name="Round Same Side Corner Rectangle 1"/>
+            <p:cNvSpPr/>
+            <p:nvPr/>
+          </p:nvSpPr>
+          <p:spPr>
+            <a:xfrm flipV="1">
+              <a:off x="472143" y="6120052"/>
+              <a:ext cx="1346200" cy="384046"/>
+            </a:xfrm>
+            <a:prstGeom prst="round2SameRect">
+              <a:avLst>
+                <a:gd name="adj1" fmla="val 50000"/>
+                <a:gd name="adj2" fmla="val 0"/>
+              </a:avLst>
+            </a:prstGeom>
+            <a:solidFill>
+              <a:schemeClr val="tx1"/>
+            </a:solidFill>
+            <a:ln>
+              <a:noFill/>
+            </a:ln>
+          </p:spPr>
+          <p:style>
+            <a:lnRef idx="2">
+              <a:schemeClr val="accent1">
+                <a:shade val="50000"/>
+              </a:schemeClr>
+            </a:lnRef>
+            <a:fillRef idx="1">
+              <a:schemeClr val="accent1"/>
+            </a:fillRef>
+            <a:effectRef idx="0">
+              <a:schemeClr val="accent1"/>
+            </a:effectRef>
+            <a:fontRef idx="minor">
+              <a:schemeClr val="lt1"/>
+            </a:fontRef>
+          </p:style>
+          <p:txBody>
+            <a:bodyPr rtlCol="0" anchor="ctr"/>
+            <a:lstStyle/>
+            <a:p>
+              <a:pPr algn="ctr"/>
+              <a:endParaRPr lang="en-US"/>
+            </a:p>
+          </p:txBody>
+        </p:sp>
+      </p:grpSp>
     </p:spTree>
     <p:extLst>
       <p:ext uri="{BB962C8B-B14F-4D97-AF65-F5344CB8AC3E}">

</xml_diff>

<commit_message>
Asynchronous texture loading from disk!! So awesome
</commit_message>
<xml_diff>
--- a/Docs/Gui.pptx
+++ b/Docs/Gui.pptx
@@ -246,7 +246,7 @@
           <a:p>
             <a:fld id="{47491EC4-C74A-4DCB-BF28-C0A7248C12D2}" type="datetimeFigureOut">
               <a:rPr lang="en-US" smtClean="0"/>
-              <a:t>3/31/2014</a:t>
+              <a:t>3/30/2014</a:t>
             </a:fld>
             <a:endParaRPr lang="en-US"/>
           </a:p>
@@ -416,7 +416,7 @@
           <a:p>
             <a:fld id="{47491EC4-C74A-4DCB-BF28-C0A7248C12D2}" type="datetimeFigureOut">
               <a:rPr lang="en-US" smtClean="0"/>
-              <a:t>3/31/2014</a:t>
+              <a:t>3/30/2014</a:t>
             </a:fld>
             <a:endParaRPr lang="en-US"/>
           </a:p>
@@ -596,7 +596,7 @@
           <a:p>
             <a:fld id="{47491EC4-C74A-4DCB-BF28-C0A7248C12D2}" type="datetimeFigureOut">
               <a:rPr lang="en-US" smtClean="0"/>
-              <a:t>3/31/2014</a:t>
+              <a:t>3/30/2014</a:t>
             </a:fld>
             <a:endParaRPr lang="en-US"/>
           </a:p>
@@ -766,7 +766,7 @@
           <a:p>
             <a:fld id="{47491EC4-C74A-4DCB-BF28-C0A7248C12D2}" type="datetimeFigureOut">
               <a:rPr lang="en-US" smtClean="0"/>
-              <a:t>3/31/2014</a:t>
+              <a:t>3/30/2014</a:t>
             </a:fld>
             <a:endParaRPr lang="en-US"/>
           </a:p>
@@ -1012,7 +1012,7 @@
           <a:p>
             <a:fld id="{47491EC4-C74A-4DCB-BF28-C0A7248C12D2}" type="datetimeFigureOut">
               <a:rPr lang="en-US" smtClean="0"/>
-              <a:t>3/31/2014</a:t>
+              <a:t>3/30/2014</a:t>
             </a:fld>
             <a:endParaRPr lang="en-US"/>
           </a:p>
@@ -1244,7 +1244,7 @@
           <a:p>
             <a:fld id="{47491EC4-C74A-4DCB-BF28-C0A7248C12D2}" type="datetimeFigureOut">
               <a:rPr lang="en-US" smtClean="0"/>
-              <a:t>3/31/2014</a:t>
+              <a:t>3/30/2014</a:t>
             </a:fld>
             <a:endParaRPr lang="en-US"/>
           </a:p>
@@ -1611,7 +1611,7 @@
           <a:p>
             <a:fld id="{47491EC4-C74A-4DCB-BF28-C0A7248C12D2}" type="datetimeFigureOut">
               <a:rPr lang="en-US" smtClean="0"/>
-              <a:t>3/31/2014</a:t>
+              <a:t>3/30/2014</a:t>
             </a:fld>
             <a:endParaRPr lang="en-US"/>
           </a:p>
@@ -1729,7 +1729,7 @@
           <a:p>
             <a:fld id="{47491EC4-C74A-4DCB-BF28-C0A7248C12D2}" type="datetimeFigureOut">
               <a:rPr lang="en-US" smtClean="0"/>
-              <a:t>3/31/2014</a:t>
+              <a:t>3/30/2014</a:t>
             </a:fld>
             <a:endParaRPr lang="en-US"/>
           </a:p>
@@ -1824,7 +1824,7 @@
           <a:p>
             <a:fld id="{47491EC4-C74A-4DCB-BF28-C0A7248C12D2}" type="datetimeFigureOut">
               <a:rPr lang="en-US" smtClean="0"/>
-              <a:t>3/31/2014</a:t>
+              <a:t>3/30/2014</a:t>
             </a:fld>
             <a:endParaRPr lang="en-US"/>
           </a:p>
@@ -2101,7 +2101,7 @@
           <a:p>
             <a:fld id="{47491EC4-C74A-4DCB-BF28-C0A7248C12D2}" type="datetimeFigureOut">
               <a:rPr lang="en-US" smtClean="0"/>
-              <a:t>3/31/2014</a:t>
+              <a:t>3/30/2014</a:t>
             </a:fld>
             <a:endParaRPr lang="en-US"/>
           </a:p>
@@ -2354,7 +2354,7 @@
           <a:p>
             <a:fld id="{47491EC4-C74A-4DCB-BF28-C0A7248C12D2}" type="datetimeFigureOut">
               <a:rPr lang="en-US" smtClean="0"/>
-              <a:t>3/31/2014</a:t>
+              <a:t>3/30/2014</a:t>
             </a:fld>
             <a:endParaRPr lang="en-US"/>
           </a:p>
@@ -2567,7 +2567,7 @@
           <a:p>
             <a:fld id="{47491EC4-C74A-4DCB-BF28-C0A7248C12D2}" type="datetimeFigureOut">
               <a:rPr lang="en-US" smtClean="0"/>
-              <a:t>3/31/2014</a:t>
+              <a:t>3/30/2014</a:t>
             </a:fld>
             <a:endParaRPr lang="en-US"/>
           </a:p>
@@ -7353,6 +7353,127 @@
           </a:p>
         </p:txBody>
       </p:sp>
+      <p:grpSp>
+        <p:nvGrpSpPr>
+          <p:cNvPr id="6" name="Group 5"/>
+          <p:cNvGrpSpPr/>
+          <p:nvPr/>
+        </p:nvGrpSpPr>
+        <p:grpSpPr>
+          <a:xfrm>
+            <a:off x="1090824" y="3098626"/>
+            <a:ext cx="2446262" cy="2446262"/>
+            <a:chOff x="1090824" y="3098626"/>
+            <a:chExt cx="2446262" cy="2446262"/>
+          </a:xfrm>
+        </p:grpSpPr>
+        <p:sp>
+          <p:nvSpPr>
+            <p:cNvPr id="3" name="Rectangle 2"/>
+            <p:cNvSpPr/>
+            <p:nvPr/>
+          </p:nvSpPr>
+          <p:spPr>
+            <a:xfrm>
+              <a:off x="1090824" y="3098626"/>
+              <a:ext cx="2446262" cy="2446262"/>
+            </a:xfrm>
+            <a:prstGeom prst="rect">
+              <a:avLst/>
+            </a:prstGeom>
+            <a:solidFill>
+              <a:schemeClr val="bg1">
+                <a:lumMod val="65000"/>
+                <a:alpha val="10000"/>
+              </a:schemeClr>
+            </a:solidFill>
+            <a:ln>
+              <a:solidFill>
+                <a:schemeClr val="tx1"/>
+              </a:solidFill>
+            </a:ln>
+          </p:spPr>
+          <p:style>
+            <a:lnRef idx="2">
+              <a:schemeClr val="accent1">
+                <a:shade val="50000"/>
+              </a:schemeClr>
+            </a:lnRef>
+            <a:fillRef idx="1">
+              <a:schemeClr val="accent1"/>
+            </a:fillRef>
+            <a:effectRef idx="0">
+              <a:schemeClr val="accent1"/>
+            </a:effectRef>
+            <a:fontRef idx="minor">
+              <a:schemeClr val="lt1"/>
+            </a:fontRef>
+          </p:style>
+          <p:txBody>
+            <a:bodyPr rtlCol="0" anchor="ctr"/>
+            <a:lstStyle/>
+            <a:p>
+              <a:pPr algn="ctr"/>
+              <a:endParaRPr lang="en-US"/>
+            </a:p>
+          </p:txBody>
+        </p:sp>
+        <p:sp>
+          <p:nvSpPr>
+            <p:cNvPr id="2" name="Rectangle 1"/>
+            <p:cNvSpPr/>
+            <p:nvPr/>
+          </p:nvSpPr>
+          <p:spPr>
+            <a:xfrm>
+              <a:off x="1121161" y="3860092"/>
+              <a:ext cx="2385589" cy="923330"/>
+            </a:xfrm>
+            <a:prstGeom prst="rect">
+              <a:avLst/>
+            </a:prstGeom>
+            <a:noFill/>
+          </p:spPr>
+          <p:txBody>
+            <a:bodyPr wrap="none" lIns="91440" tIns="45720" rIns="91440" bIns="45720">
+              <a:spAutoFit/>
+            </a:bodyPr>
+            <a:lstStyle/>
+            <a:p>
+              <a:pPr algn="ctr"/>
+              <a:r>
+                <a:rPr lang="en-US" sz="5400" b="0" cap="none" spc="0" dirty="0" smtClean="0">
+                  <a:ln w="0"/>
+                  <a:solidFill>
+                    <a:schemeClr val="tx1"/>
+                  </a:solidFill>
+                  <a:effectLst>
+                    <a:outerShdw blurRad="38100" dist="19050" dir="2700000" algn="tl" rotWithShape="0">
+                      <a:schemeClr val="dk1">
+                        <a:alpha val="40000"/>
+                      </a:schemeClr>
+                    </a:outerShdw>
+                  </a:effectLst>
+                </a:rPr>
+                <a:t>Loading</a:t>
+              </a:r>
+              <a:endParaRPr lang="en-US" sz="5400" b="0" cap="none" spc="0" dirty="0">
+                <a:ln w="0"/>
+                <a:solidFill>
+                  <a:schemeClr val="tx1"/>
+                </a:solidFill>
+                <a:effectLst>
+                  <a:outerShdw blurRad="38100" dist="19050" dir="2700000" algn="tl" rotWithShape="0">
+                    <a:schemeClr val="dk1">
+                      <a:alpha val="40000"/>
+                    </a:schemeClr>
+                  </a:outerShdw>
+                </a:effectLst>
+              </a:endParaRPr>
+            </a:p>
+          </p:txBody>
+        </p:sp>
+      </p:grpSp>
     </p:spTree>
     <p:extLst>
       <p:ext uri="{BB962C8B-B14F-4D97-AF65-F5344CB8AC3E}">

</xml_diff>

<commit_message>
Material reflection code is well under way! Now have an editor for RGBA color, and Sampler2D.
</commit_message>
<xml_diff>
--- a/Docs/Gui.pptx
+++ b/Docs/Gui.pptx
@@ -8,6 +8,7 @@
     <p:sldId id="256" r:id="rId2"/>
     <p:sldId id="257" r:id="rId3"/>
     <p:sldId id="258" r:id="rId4"/>
+    <p:sldId id="259" r:id="rId5"/>
   </p:sldIdLst>
   <p:sldSz cx="12192000" cy="6858000"/>
   <p:notesSz cx="6858000" cy="9144000"/>
@@ -245,7 +246,7 @@
           <a:p>
             <a:fld id="{47491EC4-C74A-4DCB-BF28-C0A7248C12D2}" type="datetimeFigureOut">
               <a:rPr lang="en-US" smtClean="0"/>
-              <a:t>1/21/2014</a:t>
+              <a:t>3/31/2014</a:t>
             </a:fld>
             <a:endParaRPr lang="en-US"/>
           </a:p>
@@ -415,7 +416,7 @@
           <a:p>
             <a:fld id="{47491EC4-C74A-4DCB-BF28-C0A7248C12D2}" type="datetimeFigureOut">
               <a:rPr lang="en-US" smtClean="0"/>
-              <a:t>1/21/2014</a:t>
+              <a:t>3/31/2014</a:t>
             </a:fld>
             <a:endParaRPr lang="en-US"/>
           </a:p>
@@ -595,7 +596,7 @@
           <a:p>
             <a:fld id="{47491EC4-C74A-4DCB-BF28-C0A7248C12D2}" type="datetimeFigureOut">
               <a:rPr lang="en-US" smtClean="0"/>
-              <a:t>1/21/2014</a:t>
+              <a:t>3/31/2014</a:t>
             </a:fld>
             <a:endParaRPr lang="en-US"/>
           </a:p>
@@ -765,7 +766,7 @@
           <a:p>
             <a:fld id="{47491EC4-C74A-4DCB-BF28-C0A7248C12D2}" type="datetimeFigureOut">
               <a:rPr lang="en-US" smtClean="0"/>
-              <a:t>1/21/2014</a:t>
+              <a:t>3/31/2014</a:t>
             </a:fld>
             <a:endParaRPr lang="en-US"/>
           </a:p>
@@ -1011,7 +1012,7 @@
           <a:p>
             <a:fld id="{47491EC4-C74A-4DCB-BF28-C0A7248C12D2}" type="datetimeFigureOut">
               <a:rPr lang="en-US" smtClean="0"/>
-              <a:t>1/21/2014</a:t>
+              <a:t>3/31/2014</a:t>
             </a:fld>
             <a:endParaRPr lang="en-US"/>
           </a:p>
@@ -1243,7 +1244,7 @@
           <a:p>
             <a:fld id="{47491EC4-C74A-4DCB-BF28-C0A7248C12D2}" type="datetimeFigureOut">
               <a:rPr lang="en-US" smtClean="0"/>
-              <a:t>1/21/2014</a:t>
+              <a:t>3/31/2014</a:t>
             </a:fld>
             <a:endParaRPr lang="en-US"/>
           </a:p>
@@ -1610,7 +1611,7 @@
           <a:p>
             <a:fld id="{47491EC4-C74A-4DCB-BF28-C0A7248C12D2}" type="datetimeFigureOut">
               <a:rPr lang="en-US" smtClean="0"/>
-              <a:t>1/21/2014</a:t>
+              <a:t>3/31/2014</a:t>
             </a:fld>
             <a:endParaRPr lang="en-US"/>
           </a:p>
@@ -1728,7 +1729,7 @@
           <a:p>
             <a:fld id="{47491EC4-C74A-4DCB-BF28-C0A7248C12D2}" type="datetimeFigureOut">
               <a:rPr lang="en-US" smtClean="0"/>
-              <a:t>1/21/2014</a:t>
+              <a:t>3/31/2014</a:t>
             </a:fld>
             <a:endParaRPr lang="en-US"/>
           </a:p>
@@ -1823,7 +1824,7 @@
           <a:p>
             <a:fld id="{47491EC4-C74A-4DCB-BF28-C0A7248C12D2}" type="datetimeFigureOut">
               <a:rPr lang="en-US" smtClean="0"/>
-              <a:t>1/21/2014</a:t>
+              <a:t>3/31/2014</a:t>
             </a:fld>
             <a:endParaRPr lang="en-US"/>
           </a:p>
@@ -2100,7 +2101,7 @@
           <a:p>
             <a:fld id="{47491EC4-C74A-4DCB-BF28-C0A7248C12D2}" type="datetimeFigureOut">
               <a:rPr lang="en-US" smtClean="0"/>
-              <a:t>1/21/2014</a:t>
+              <a:t>3/31/2014</a:t>
             </a:fld>
             <a:endParaRPr lang="en-US"/>
           </a:p>
@@ -2353,7 +2354,7 @@
           <a:p>
             <a:fld id="{47491EC4-C74A-4DCB-BF28-C0A7248C12D2}" type="datetimeFigureOut">
               <a:rPr lang="en-US" smtClean="0"/>
-              <a:t>1/21/2014</a:t>
+              <a:t>3/31/2014</a:t>
             </a:fld>
             <a:endParaRPr lang="en-US"/>
           </a:p>
@@ -2566,7 +2567,7 @@
           <a:p>
             <a:fld id="{47491EC4-C74A-4DCB-BF28-C0A7248C12D2}" type="datetimeFigureOut">
               <a:rPr lang="en-US" smtClean="0"/>
-              <a:t>1/21/2014</a:t>
+              <a:t>3/31/2014</a:t>
             </a:fld>
             <a:endParaRPr lang="en-US"/>
           </a:p>
@@ -7365,6 +7366,181 @@
 </p:sld>
 </file>
 
+<file path=ppt/slides/slide4.xml><?xml version="1.0" encoding="utf-8"?>
+<p:sld xmlns:a="http://schemas.openxmlformats.org/drawingml/2006/main" xmlns:r="http://schemas.openxmlformats.org/officeDocument/2006/relationships" xmlns:p="http://schemas.openxmlformats.org/presentationml/2006/main">
+  <p:cSld>
+    <p:spTree>
+      <p:nvGrpSpPr>
+        <p:cNvPr id="1" name=""/>
+        <p:cNvGrpSpPr/>
+        <p:nvPr/>
+      </p:nvGrpSpPr>
+      <p:grpSpPr>
+        <a:xfrm>
+          <a:off x="0" y="0"/>
+          <a:ext cx="0" cy="0"/>
+          <a:chOff x="0" y="0"/>
+          <a:chExt cx="0" cy="0"/>
+        </a:xfrm>
+      </p:grpSpPr>
+      <p:sp>
+        <p:nvSpPr>
+          <p:cNvPr id="5" name="Rectangle 4"/>
+          <p:cNvSpPr/>
+          <p:nvPr/>
+        </p:nvSpPr>
+        <p:spPr>
+          <a:xfrm>
+            <a:off x="0" y="299533"/>
+            <a:ext cx="12192000" cy="2159000"/>
+          </a:xfrm>
+          <a:prstGeom prst="rect">
+            <a:avLst/>
+          </a:prstGeom>
+          <a:solidFill>
+            <a:schemeClr val="bg1">
+              <a:lumMod val="75000"/>
+            </a:schemeClr>
+          </a:solidFill>
+        </p:spPr>
+        <p:style>
+          <a:lnRef idx="2">
+            <a:schemeClr val="accent1">
+              <a:shade val="50000"/>
+            </a:schemeClr>
+          </a:lnRef>
+          <a:fillRef idx="1">
+            <a:schemeClr val="accent1"/>
+          </a:fillRef>
+          <a:effectRef idx="0">
+            <a:schemeClr val="accent1"/>
+          </a:effectRef>
+          <a:fontRef idx="minor">
+            <a:schemeClr val="lt1"/>
+          </a:fontRef>
+        </p:style>
+        <p:txBody>
+          <a:bodyPr rtlCol="0" anchor="ctr"/>
+          <a:lstStyle/>
+          <a:p>
+            <a:pPr algn="ctr"/>
+            <a:endParaRPr lang="en-US"/>
+          </a:p>
+        </p:txBody>
+      </p:sp>
+      <p:sp>
+        <p:nvSpPr>
+          <p:cNvPr id="2" name="Rectangle 1"/>
+          <p:cNvSpPr/>
+          <p:nvPr/>
+        </p:nvSpPr>
+        <p:spPr>
+          <a:xfrm>
+            <a:off x="3183850" y="4848142"/>
+            <a:ext cx="779133" cy="779133"/>
+          </a:xfrm>
+          <a:prstGeom prst="rect">
+            <a:avLst/>
+          </a:prstGeom>
+          <a:solidFill>
+            <a:schemeClr val="bg1">
+              <a:lumMod val="50000"/>
+            </a:schemeClr>
+          </a:solidFill>
+          <a:ln>
+            <a:solidFill>
+              <a:schemeClr val="bg1"/>
+            </a:solidFill>
+          </a:ln>
+          <a:scene3d>
+            <a:camera prst="isometricLeftDown"/>
+            <a:lightRig rig="threePt" dir="t"/>
+          </a:scene3d>
+          <a:sp3d>
+            <a:bevelT w="0" h="787400"/>
+          </a:sp3d>
+        </p:spPr>
+        <p:style>
+          <a:lnRef idx="2">
+            <a:schemeClr val="accent1">
+              <a:shade val="50000"/>
+            </a:schemeClr>
+          </a:lnRef>
+          <a:fillRef idx="1">
+            <a:schemeClr val="accent1"/>
+          </a:fillRef>
+          <a:effectRef idx="0">
+            <a:schemeClr val="accent1"/>
+          </a:effectRef>
+          <a:fontRef idx="minor">
+            <a:schemeClr val="lt1"/>
+          </a:fontRef>
+        </p:style>
+        <p:txBody>
+          <a:bodyPr rtlCol="0" anchor="ctr"/>
+          <a:lstStyle/>
+          <a:p>
+            <a:pPr algn="ctr"/>
+            <a:endParaRPr lang="en-US"/>
+          </a:p>
+        </p:txBody>
+      </p:sp>
+      <p:sp>
+        <p:nvSpPr>
+          <p:cNvPr id="7" name="Oval 6"/>
+          <p:cNvSpPr/>
+          <p:nvPr/>
+        </p:nvSpPr>
+        <p:spPr>
+          <a:xfrm>
+            <a:off x="4619064" y="4410316"/>
+            <a:ext cx="1216959" cy="1216959"/>
+          </a:xfrm>
+          <a:prstGeom prst="ellipse">
+            <a:avLst/>
+          </a:prstGeom>
+          <a:solidFill>
+            <a:srgbClr val="B7B7B8"/>
+          </a:solidFill>
+        </p:spPr>
+        <p:style>
+          <a:lnRef idx="2">
+            <a:schemeClr val="accent1">
+              <a:shade val="50000"/>
+            </a:schemeClr>
+          </a:lnRef>
+          <a:fillRef idx="1">
+            <a:schemeClr val="accent1"/>
+          </a:fillRef>
+          <a:effectRef idx="0">
+            <a:schemeClr val="accent1"/>
+          </a:effectRef>
+          <a:fontRef idx="minor">
+            <a:schemeClr val="lt1"/>
+          </a:fontRef>
+        </p:style>
+        <p:txBody>
+          <a:bodyPr rtlCol="0" anchor="ctr"/>
+          <a:lstStyle/>
+          <a:p>
+            <a:pPr algn="ctr"/>
+            <a:endParaRPr lang="en-US"/>
+          </a:p>
+        </p:txBody>
+      </p:sp>
+    </p:spTree>
+    <p:extLst>
+      <p:ext uri="{BB962C8B-B14F-4D97-AF65-F5344CB8AC3E}">
+        <p14:creationId xmlns:p14="http://schemas.microsoft.com/office/powerpoint/2010/main" val="966290046"/>
+      </p:ext>
+    </p:extLst>
+  </p:cSld>
+  <p:clrMapOvr>
+    <a:masterClrMapping/>
+  </p:clrMapOvr>
+</p:sld>
+</file>
+
 <file path=ppt/theme/theme1.xml><?xml version="1.0" encoding="utf-8"?>
 <a:theme xmlns:a="http://schemas.openxmlformats.org/drawingml/2006/main" name="Office Theme">
   <a:themeElements>

</xml_diff>